<commit_message>
Adding image for 0.9.6 docs
</commit_message>
<xml_diff>
--- a/docs/version.pptx
+++ b/docs/version.pptx
@@ -104,6 +104,22 @@
       </a:defRPr>
     </a:lvl9pPr>
   </p:defaultTextStyle>
+  <p:extLst>
+    <p:ext uri="{EFAFB233-063F-42B5-8137-9DF3F51BA10A}">
+      <p15:sldGuideLst xmlns:p15="http://schemas.microsoft.com/office/powerpoint/2012/main">
+        <p15:guide id="1" orient="horz" pos="2160">
+          <p15:clr>
+            <a:srgbClr val="A4A3A4"/>
+          </p15:clr>
+        </p15:guide>
+        <p15:guide id="2" pos="2880">
+          <p15:clr>
+            <a:srgbClr val="A4A3A4"/>
+          </p15:clr>
+        </p15:guide>
+      </p15:sldGuideLst>
+    </p:ext>
+  </p:extLst>
 </p:presentation>
 </file>
 
@@ -288,7 +304,7 @@
           <a:p>
             <a:fld id="{78D91B59-3308-4288-9FFB-76344938B6F4}" type="datetimeFigureOut">
               <a:rPr lang="en-US" smtClean="0"/>
-              <a:t>10/5/2012</a:t>
+              <a:t>4/7/2013</a:t>
             </a:fld>
             <a:endParaRPr lang="en-US"/>
           </a:p>
@@ -458,7 +474,7 @@
           <a:p>
             <a:fld id="{78D91B59-3308-4288-9FFB-76344938B6F4}" type="datetimeFigureOut">
               <a:rPr lang="en-US" smtClean="0"/>
-              <a:t>10/5/2012</a:t>
+              <a:t>4/7/2013</a:t>
             </a:fld>
             <a:endParaRPr lang="en-US"/>
           </a:p>
@@ -638,7 +654,7 @@
           <a:p>
             <a:fld id="{78D91B59-3308-4288-9FFB-76344938B6F4}" type="datetimeFigureOut">
               <a:rPr lang="en-US" smtClean="0"/>
-              <a:t>10/5/2012</a:t>
+              <a:t>4/7/2013</a:t>
             </a:fld>
             <a:endParaRPr lang="en-US"/>
           </a:p>
@@ -808,7 +824,7 @@
           <a:p>
             <a:fld id="{78D91B59-3308-4288-9FFB-76344938B6F4}" type="datetimeFigureOut">
               <a:rPr lang="en-US" smtClean="0"/>
-              <a:t>10/5/2012</a:t>
+              <a:t>4/7/2013</a:t>
             </a:fld>
             <a:endParaRPr lang="en-US"/>
           </a:p>
@@ -1054,7 +1070,7 @@
           <a:p>
             <a:fld id="{78D91B59-3308-4288-9FFB-76344938B6F4}" type="datetimeFigureOut">
               <a:rPr lang="en-US" smtClean="0"/>
-              <a:t>10/5/2012</a:t>
+              <a:t>4/7/2013</a:t>
             </a:fld>
             <a:endParaRPr lang="en-US"/>
           </a:p>
@@ -1342,7 +1358,7 @@
           <a:p>
             <a:fld id="{78D91B59-3308-4288-9FFB-76344938B6F4}" type="datetimeFigureOut">
               <a:rPr lang="en-US" smtClean="0"/>
-              <a:t>10/5/2012</a:t>
+              <a:t>4/7/2013</a:t>
             </a:fld>
             <a:endParaRPr lang="en-US"/>
           </a:p>
@@ -1764,7 +1780,7 @@
           <a:p>
             <a:fld id="{78D91B59-3308-4288-9FFB-76344938B6F4}" type="datetimeFigureOut">
               <a:rPr lang="en-US" smtClean="0"/>
-              <a:t>10/5/2012</a:t>
+              <a:t>4/7/2013</a:t>
             </a:fld>
             <a:endParaRPr lang="en-US"/>
           </a:p>
@@ -1882,7 +1898,7 @@
           <a:p>
             <a:fld id="{78D91B59-3308-4288-9FFB-76344938B6F4}" type="datetimeFigureOut">
               <a:rPr lang="en-US" smtClean="0"/>
-              <a:t>10/5/2012</a:t>
+              <a:t>4/7/2013</a:t>
             </a:fld>
             <a:endParaRPr lang="en-US"/>
           </a:p>
@@ -1977,7 +1993,7 @@
           <a:p>
             <a:fld id="{78D91B59-3308-4288-9FFB-76344938B6F4}" type="datetimeFigureOut">
               <a:rPr lang="en-US" smtClean="0"/>
-              <a:t>10/5/2012</a:t>
+              <a:t>4/7/2013</a:t>
             </a:fld>
             <a:endParaRPr lang="en-US"/>
           </a:p>
@@ -2254,7 +2270,7 @@
           <a:p>
             <a:fld id="{78D91B59-3308-4288-9FFB-76344938B6F4}" type="datetimeFigureOut">
               <a:rPr lang="en-US" smtClean="0"/>
-              <a:t>10/5/2012</a:t>
+              <a:t>4/7/2013</a:t>
             </a:fld>
             <a:endParaRPr lang="en-US"/>
           </a:p>
@@ -2507,7 +2523,7 @@
           <a:p>
             <a:fld id="{78D91B59-3308-4288-9FFB-76344938B6F4}" type="datetimeFigureOut">
               <a:rPr lang="en-US" smtClean="0"/>
-              <a:t>10/5/2012</a:t>
+              <a:t>4/7/2013</a:t>
             </a:fld>
             <a:endParaRPr lang="en-US"/>
           </a:p>
@@ -2720,7 +2736,7 @@
           <a:p>
             <a:fld id="{78D91B59-3308-4288-9FFB-76344938B6F4}" type="datetimeFigureOut">
               <a:rPr lang="en-US" smtClean="0"/>
-              <a:t>10/5/2012</a:t>
+              <a:t>4/7/2013</a:t>
             </a:fld>
             <a:endParaRPr lang="en-US"/>
           </a:p>
@@ -3124,8 +3140,89 @@
                 </a:solidFill>
                 <a:latin typeface="Serpentine-Bold-Bold" pitchFamily="2" charset="0"/>
               </a:rPr>
-              <a:t>HPX V0.9.5</a:t>
-            </a:r>
+              <a:t>HPX </a:t>
+            </a:r>
+            <a:r>
+              <a:rPr lang="en-US" sz="4800" i="1" dirty="0" smtClean="0">
+                <a:solidFill>
+                  <a:srgbClr val="243C9B"/>
+                </a:solidFill>
+                <a:latin typeface="Serpentine-Bold-Bold" pitchFamily="2" charset="0"/>
+              </a:rPr>
+              <a:t>V0.9.5</a:t>
+            </a:r>
+            <a:endParaRPr lang="en-US" sz="4800" i="1" dirty="0" smtClean="0">
+              <a:solidFill>
+                <a:srgbClr val="243C9B"/>
+              </a:solidFill>
+              <a:latin typeface="Serpentine-Bold-Bold" pitchFamily="2" charset="0"/>
+            </a:endParaRPr>
+          </a:p>
+          <a:p>
+            <a:r>
+              <a:rPr lang="en-US" sz="2000" i="1" dirty="0" smtClean="0">
+                <a:solidFill>
+                  <a:srgbClr val="243C9B"/>
+                </a:solidFill>
+                <a:latin typeface="Serpentine-Bold-Bold" pitchFamily="2" charset="0"/>
+              </a:rPr>
+              <a:t>High Performance ParalleX</a:t>
+            </a:r>
+            <a:endParaRPr lang="en-US" sz="2000" i="1" dirty="0">
+              <a:solidFill>
+                <a:srgbClr val="243C9B"/>
+              </a:solidFill>
+              <a:latin typeface="Serpentine-Bold-Bold" pitchFamily="2" charset="0"/>
+            </a:endParaRPr>
+          </a:p>
+        </p:txBody>
+      </p:sp>
+      <p:sp>
+        <p:nvSpPr>
+          <p:cNvPr id="3" name="TextBox 2"/>
+          <p:cNvSpPr txBox="1"/>
+          <p:nvPr/>
+        </p:nvSpPr>
+        <p:spPr>
+          <a:xfrm>
+            <a:off x="1828800" y="2859613"/>
+            <a:ext cx="4187365" cy="1138773"/>
+          </a:xfrm>
+          <a:prstGeom prst="rect">
+            <a:avLst/>
+          </a:prstGeom>
+          <a:noFill/>
+        </p:spPr>
+        <p:txBody>
+          <a:bodyPr wrap="none" rtlCol="0">
+            <a:spAutoFit/>
+          </a:bodyPr>
+          <a:lstStyle/>
+          <a:p>
+            <a:r>
+              <a:rPr lang="en-US" sz="4800" i="1" dirty="0" smtClean="0">
+                <a:solidFill>
+                  <a:srgbClr val="243C9B"/>
+                </a:solidFill>
+                <a:latin typeface="Serpentine-Bold-Bold" pitchFamily="2" charset="0"/>
+              </a:rPr>
+              <a:t>HPX </a:t>
+            </a:r>
+            <a:r>
+              <a:rPr lang="en-US" sz="4800" i="1" dirty="0" smtClean="0">
+                <a:solidFill>
+                  <a:srgbClr val="243C9B"/>
+                </a:solidFill>
+                <a:latin typeface="Serpentine-Bold-Bold" pitchFamily="2" charset="0"/>
+              </a:rPr>
+              <a:t>V0.9.6</a:t>
+            </a:r>
+            <a:endParaRPr lang="en-US" sz="4800" i="1" dirty="0" smtClean="0">
+              <a:solidFill>
+                <a:srgbClr val="243C9B"/>
+              </a:solidFill>
+              <a:latin typeface="Serpentine-Bold-Bold" pitchFamily="2" charset="0"/>
+            </a:endParaRPr>
           </a:p>
           <a:p>
             <a:r>

</xml_diff>

<commit_message>
Switching all versioning to V0.9.7 in preparation for the upcoming release
</commit_message>
<xml_diff>
--- a/docs/version.pptx
+++ b/docs/version.pptx
@@ -6,6 +6,7 @@
   </p:sldMasterIdLst>
   <p:sldIdLst>
     <p:sldId id="256" r:id="rId2"/>
+    <p:sldId id="257" r:id="rId3"/>
   </p:sldIdLst>
   <p:sldSz cx="9144000" cy="6858000" type="screen4x3"/>
   <p:notesSz cx="6858000" cy="9144000"/>
@@ -304,7 +305,7 @@
           <a:p>
             <a:fld id="{78D91B59-3308-4288-9FFB-76344938B6F4}" type="datetimeFigureOut">
               <a:rPr lang="en-US" smtClean="0"/>
-              <a:t>9/28/2013</a:t>
+              <a:t>10/7/2013</a:t>
             </a:fld>
             <a:endParaRPr lang="en-US"/>
           </a:p>
@@ -474,7 +475,7 @@
           <a:p>
             <a:fld id="{78D91B59-3308-4288-9FFB-76344938B6F4}" type="datetimeFigureOut">
               <a:rPr lang="en-US" smtClean="0"/>
-              <a:t>9/28/2013</a:t>
+              <a:t>10/7/2013</a:t>
             </a:fld>
             <a:endParaRPr lang="en-US"/>
           </a:p>
@@ -654,7 +655,7 @@
           <a:p>
             <a:fld id="{78D91B59-3308-4288-9FFB-76344938B6F4}" type="datetimeFigureOut">
               <a:rPr lang="en-US" smtClean="0"/>
-              <a:t>9/28/2013</a:t>
+              <a:t>10/7/2013</a:t>
             </a:fld>
             <a:endParaRPr lang="en-US"/>
           </a:p>
@@ -824,7 +825,7 @@
           <a:p>
             <a:fld id="{78D91B59-3308-4288-9FFB-76344938B6F4}" type="datetimeFigureOut">
               <a:rPr lang="en-US" smtClean="0"/>
-              <a:t>9/28/2013</a:t>
+              <a:t>10/7/2013</a:t>
             </a:fld>
             <a:endParaRPr lang="en-US"/>
           </a:p>
@@ -1070,7 +1071,7 @@
           <a:p>
             <a:fld id="{78D91B59-3308-4288-9FFB-76344938B6F4}" type="datetimeFigureOut">
               <a:rPr lang="en-US" smtClean="0"/>
-              <a:t>9/28/2013</a:t>
+              <a:t>10/7/2013</a:t>
             </a:fld>
             <a:endParaRPr lang="en-US"/>
           </a:p>
@@ -1358,7 +1359,7 @@
           <a:p>
             <a:fld id="{78D91B59-3308-4288-9FFB-76344938B6F4}" type="datetimeFigureOut">
               <a:rPr lang="en-US" smtClean="0"/>
-              <a:t>9/28/2013</a:t>
+              <a:t>10/7/2013</a:t>
             </a:fld>
             <a:endParaRPr lang="en-US"/>
           </a:p>
@@ -1780,7 +1781,7 @@
           <a:p>
             <a:fld id="{78D91B59-3308-4288-9FFB-76344938B6F4}" type="datetimeFigureOut">
               <a:rPr lang="en-US" smtClean="0"/>
-              <a:t>9/28/2013</a:t>
+              <a:t>10/7/2013</a:t>
             </a:fld>
             <a:endParaRPr lang="en-US"/>
           </a:p>
@@ -1898,7 +1899,7 @@
           <a:p>
             <a:fld id="{78D91B59-3308-4288-9FFB-76344938B6F4}" type="datetimeFigureOut">
               <a:rPr lang="en-US" smtClean="0"/>
-              <a:t>9/28/2013</a:t>
+              <a:t>10/7/2013</a:t>
             </a:fld>
             <a:endParaRPr lang="en-US"/>
           </a:p>
@@ -1993,7 +1994,7 @@
           <a:p>
             <a:fld id="{78D91B59-3308-4288-9FFB-76344938B6F4}" type="datetimeFigureOut">
               <a:rPr lang="en-US" smtClean="0"/>
-              <a:t>9/28/2013</a:t>
+              <a:t>10/7/2013</a:t>
             </a:fld>
             <a:endParaRPr lang="en-US"/>
           </a:p>
@@ -2270,7 +2271,7 @@
           <a:p>
             <a:fld id="{78D91B59-3308-4288-9FFB-76344938B6F4}" type="datetimeFigureOut">
               <a:rPr lang="en-US" smtClean="0"/>
-              <a:t>9/28/2013</a:t>
+              <a:t>10/7/2013</a:t>
             </a:fld>
             <a:endParaRPr lang="en-US"/>
           </a:p>
@@ -2523,7 +2524,7 @@
           <a:p>
             <a:fld id="{78D91B59-3308-4288-9FFB-76344938B6F4}" type="datetimeFigureOut">
               <a:rPr lang="en-US" smtClean="0"/>
-              <a:t>9/28/2013</a:t>
+              <a:t>10/7/2013</a:t>
             </a:fld>
             <a:endParaRPr lang="en-US"/>
           </a:p>
@@ -2736,7 +2737,7 @@
           <a:p>
             <a:fld id="{78D91B59-3308-4288-9FFB-76344938B6F4}" type="datetimeFigureOut">
               <a:rPr lang="en-US" smtClean="0"/>
-              <a:t>9/28/2013</a:t>
+              <a:t>10/7/2013</a:t>
             </a:fld>
             <a:endParaRPr lang="en-US"/>
           </a:p>
@@ -3256,23 +3257,8 @@
                   </a:solidFill>
                   <a:latin typeface="Serpentine-Bold-Bold" pitchFamily="2" charset="0"/>
                 </a:rPr>
-                <a:t>HPX </a:t>
+                <a:t>HPX V1.0</a:t>
               </a:r>
-              <a:r>
-                <a:rPr lang="en-US" sz="4800" i="1" dirty="0" smtClean="0">
-                  <a:solidFill>
-                    <a:srgbClr val="243C9B"/>
-                  </a:solidFill>
-                  <a:latin typeface="Serpentine-Bold-Bold" pitchFamily="2" charset="0"/>
-                </a:rPr>
-                <a:t>V1.0</a:t>
-              </a:r>
-              <a:endParaRPr lang="en-US" sz="4800" i="1" dirty="0" smtClean="0">
-                <a:solidFill>
-                  <a:srgbClr val="243C9B"/>
-                </a:solidFill>
-                <a:latin typeface="Serpentine-Bold-Bold" pitchFamily="2" charset="0"/>
-              </a:endParaRPr>
             </a:p>
             <a:p>
               <a:r>
@@ -3342,6 +3328,161 @@
     <p:extLst>
       <p:ext uri="{BB962C8B-B14F-4D97-AF65-F5344CB8AC3E}">
         <p14:creationId xmlns:p14="http://schemas.microsoft.com/office/powerpoint/2010/main" val="2833828608"/>
+      </p:ext>
+    </p:extLst>
+  </p:cSld>
+  <p:clrMapOvr>
+    <a:masterClrMapping/>
+  </p:clrMapOvr>
+</p:sld>
+</file>
+
+<file path=ppt/slides/slide2.xml><?xml version="1.0" encoding="utf-8"?>
+<p:sld xmlns:a="http://schemas.openxmlformats.org/drawingml/2006/main" xmlns:r="http://schemas.openxmlformats.org/officeDocument/2006/relationships" xmlns:p="http://schemas.openxmlformats.org/presentationml/2006/main">
+  <p:cSld>
+    <p:spTree>
+      <p:nvGrpSpPr>
+        <p:cNvPr id="1" name=""/>
+        <p:cNvGrpSpPr/>
+        <p:nvPr/>
+      </p:nvGrpSpPr>
+      <p:grpSpPr>
+        <a:xfrm>
+          <a:off x="0" y="0"/>
+          <a:ext cx="0" cy="0"/>
+          <a:chOff x="0" y="0"/>
+          <a:chExt cx="0" cy="0"/>
+        </a:xfrm>
+      </p:grpSpPr>
+      <p:grpSp>
+        <p:nvGrpSpPr>
+          <p:cNvPr id="4" name="Group 3"/>
+          <p:cNvGrpSpPr/>
+          <p:nvPr/>
+        </p:nvGrpSpPr>
+        <p:grpSpPr>
+          <a:xfrm>
+            <a:off x="1828800" y="2859613"/>
+            <a:ext cx="4444044" cy="954107"/>
+            <a:chOff x="1828800" y="2859613"/>
+            <a:chExt cx="4444044" cy="954107"/>
+          </a:xfrm>
+        </p:grpSpPr>
+        <p:sp>
+          <p:nvSpPr>
+            <p:cNvPr id="2" name="TextBox 1"/>
+            <p:cNvSpPr txBox="1"/>
+            <p:nvPr/>
+          </p:nvSpPr>
+          <p:spPr>
+            <a:xfrm>
+              <a:off x="1828800" y="2859613"/>
+              <a:ext cx="4187365" cy="954107"/>
+            </a:xfrm>
+            <a:prstGeom prst="rect">
+              <a:avLst/>
+            </a:prstGeom>
+            <a:noFill/>
+          </p:spPr>
+          <p:txBody>
+            <a:bodyPr wrap="none" rtlCol="0">
+              <a:spAutoFit/>
+            </a:bodyPr>
+            <a:lstStyle/>
+            <a:p>
+              <a:r>
+                <a:rPr lang="en-US" sz="3600" i="1" dirty="0" smtClean="0">
+                  <a:solidFill>
+                    <a:srgbClr val="243C9B"/>
+                  </a:solidFill>
+                  <a:latin typeface="Serpentine-Bold-Bold" pitchFamily="2" charset="0"/>
+                </a:rPr>
+                <a:t>HPX </a:t>
+              </a:r>
+              <a:r>
+                <a:rPr lang="en-US" sz="3600" i="1" dirty="0" smtClean="0">
+                  <a:solidFill>
+                    <a:srgbClr val="243C9B"/>
+                  </a:solidFill>
+                  <a:latin typeface="Serpentine-Bold-Bold" pitchFamily="2" charset="0"/>
+                </a:rPr>
+                <a:t>V0.9.7</a:t>
+              </a:r>
+              <a:endParaRPr lang="en-US" sz="3600" i="1" dirty="0" smtClean="0">
+                <a:solidFill>
+                  <a:srgbClr val="243C9B"/>
+                </a:solidFill>
+                <a:latin typeface="Serpentine-Bold-Bold" pitchFamily="2" charset="0"/>
+              </a:endParaRPr>
+            </a:p>
+            <a:p>
+              <a:r>
+                <a:rPr lang="en-US" sz="2000" i="1" dirty="0" smtClean="0">
+                  <a:solidFill>
+                    <a:srgbClr val="243C9B"/>
+                  </a:solidFill>
+                  <a:latin typeface="Serpentine-Bold-Bold" pitchFamily="2" charset="0"/>
+                </a:rPr>
+                <a:t>High Performance ParalleX</a:t>
+              </a:r>
+              <a:endParaRPr lang="en-US" sz="2000" i="1" dirty="0">
+                <a:solidFill>
+                  <a:srgbClr val="243C9B"/>
+                </a:solidFill>
+                <a:latin typeface="Serpentine-Bold-Bold" pitchFamily="2" charset="0"/>
+              </a:endParaRPr>
+            </a:p>
+          </p:txBody>
+        </p:sp>
+        <p:sp>
+          <p:nvSpPr>
+            <p:cNvPr id="3" name="TextBox 2"/>
+            <p:cNvSpPr txBox="1"/>
+            <p:nvPr/>
+          </p:nvSpPr>
+          <p:spPr>
+            <a:xfrm>
+              <a:off x="4901244" y="3070156"/>
+              <a:ext cx="1371600" cy="400110"/>
+            </a:xfrm>
+            <a:prstGeom prst="rect">
+              <a:avLst/>
+            </a:prstGeom>
+            <a:noFill/>
+          </p:spPr>
+          <p:txBody>
+            <a:bodyPr wrap="square" rtlCol="0">
+              <a:spAutoFit/>
+            </a:bodyPr>
+            <a:lstStyle/>
+            <a:p>
+              <a:r>
+                <a:rPr lang="en-US" sz="2000" dirty="0" smtClean="0">
+                  <a:solidFill>
+                    <a:srgbClr val="C00000">
+                      <a:alpha val="90000"/>
+                    </a:srgbClr>
+                  </a:solidFill>
+                  <a:latin typeface="Arial Black" panose="020B0A04020102020204" pitchFamily="34" charset="0"/>
+                </a:rPr>
+                <a:t>DRAFT</a:t>
+              </a:r>
+              <a:endParaRPr lang="en-US" sz="2000" dirty="0">
+                <a:solidFill>
+                  <a:srgbClr val="C00000">
+                    <a:alpha val="90000"/>
+                  </a:srgbClr>
+                </a:solidFill>
+                <a:latin typeface="Arial Black" panose="020B0A04020102020204" pitchFamily="34" charset="0"/>
+              </a:endParaRPr>
+            </a:p>
+          </p:txBody>
+        </p:sp>
+      </p:grpSp>
+    </p:spTree>
+    <p:extLst>
+      <p:ext uri="{BB962C8B-B14F-4D97-AF65-F5344CB8AC3E}">
+        <p14:creationId xmlns:p14="http://schemas.microsoft.com/office/powerpoint/2010/main" val="1725541328"/>
       </p:ext>
     </p:extLst>
   </p:cSld>

</xml_diff>

<commit_message>
Adding images for next version
</commit_message>
<xml_diff>
--- a/docs/version.pptx
+++ b/docs/version.pptx
@@ -305,7 +305,7 @@
           <a:p>
             <a:fld id="{78D91B59-3308-4288-9FFB-76344938B6F4}" type="datetimeFigureOut">
               <a:rPr lang="en-US" smtClean="0"/>
-              <a:t>10/7/2013</a:t>
+              <a:t>11/9/2013</a:t>
             </a:fld>
             <a:endParaRPr lang="en-US"/>
           </a:p>
@@ -475,7 +475,7 @@
           <a:p>
             <a:fld id="{78D91B59-3308-4288-9FFB-76344938B6F4}" type="datetimeFigureOut">
               <a:rPr lang="en-US" smtClean="0"/>
-              <a:t>10/7/2013</a:t>
+              <a:t>11/9/2013</a:t>
             </a:fld>
             <a:endParaRPr lang="en-US"/>
           </a:p>
@@ -655,7 +655,7 @@
           <a:p>
             <a:fld id="{78D91B59-3308-4288-9FFB-76344938B6F4}" type="datetimeFigureOut">
               <a:rPr lang="en-US" smtClean="0"/>
-              <a:t>10/7/2013</a:t>
+              <a:t>11/9/2013</a:t>
             </a:fld>
             <a:endParaRPr lang="en-US"/>
           </a:p>
@@ -825,7 +825,7 @@
           <a:p>
             <a:fld id="{78D91B59-3308-4288-9FFB-76344938B6F4}" type="datetimeFigureOut">
               <a:rPr lang="en-US" smtClean="0"/>
-              <a:t>10/7/2013</a:t>
+              <a:t>11/9/2013</a:t>
             </a:fld>
             <a:endParaRPr lang="en-US"/>
           </a:p>
@@ -1071,7 +1071,7 @@
           <a:p>
             <a:fld id="{78D91B59-3308-4288-9FFB-76344938B6F4}" type="datetimeFigureOut">
               <a:rPr lang="en-US" smtClean="0"/>
-              <a:t>10/7/2013</a:t>
+              <a:t>11/9/2013</a:t>
             </a:fld>
             <a:endParaRPr lang="en-US"/>
           </a:p>
@@ -1359,7 +1359,7 @@
           <a:p>
             <a:fld id="{78D91B59-3308-4288-9FFB-76344938B6F4}" type="datetimeFigureOut">
               <a:rPr lang="en-US" smtClean="0"/>
-              <a:t>10/7/2013</a:t>
+              <a:t>11/9/2013</a:t>
             </a:fld>
             <a:endParaRPr lang="en-US"/>
           </a:p>
@@ -1781,7 +1781,7 @@
           <a:p>
             <a:fld id="{78D91B59-3308-4288-9FFB-76344938B6F4}" type="datetimeFigureOut">
               <a:rPr lang="en-US" smtClean="0"/>
-              <a:t>10/7/2013</a:t>
+              <a:t>11/9/2013</a:t>
             </a:fld>
             <a:endParaRPr lang="en-US"/>
           </a:p>
@@ -1899,7 +1899,7 @@
           <a:p>
             <a:fld id="{78D91B59-3308-4288-9FFB-76344938B6F4}" type="datetimeFigureOut">
               <a:rPr lang="en-US" smtClean="0"/>
-              <a:t>10/7/2013</a:t>
+              <a:t>11/9/2013</a:t>
             </a:fld>
             <a:endParaRPr lang="en-US"/>
           </a:p>
@@ -1994,7 +1994,7 @@
           <a:p>
             <a:fld id="{78D91B59-3308-4288-9FFB-76344938B6F4}" type="datetimeFigureOut">
               <a:rPr lang="en-US" smtClean="0"/>
-              <a:t>10/7/2013</a:t>
+              <a:t>11/9/2013</a:t>
             </a:fld>
             <a:endParaRPr lang="en-US"/>
           </a:p>
@@ -2271,7 +2271,7 @@
           <a:p>
             <a:fld id="{78D91B59-3308-4288-9FFB-76344938B6F4}" type="datetimeFigureOut">
               <a:rPr lang="en-US" smtClean="0"/>
-              <a:t>10/7/2013</a:t>
+              <a:t>11/9/2013</a:t>
             </a:fld>
             <a:endParaRPr lang="en-US"/>
           </a:p>
@@ -2524,7 +2524,7 @@
           <a:p>
             <a:fld id="{78D91B59-3308-4288-9FFB-76344938B6F4}" type="datetimeFigureOut">
               <a:rPr lang="en-US" smtClean="0"/>
-              <a:t>10/7/2013</a:t>
+              <a:t>11/9/2013</a:t>
             </a:fld>
             <a:endParaRPr lang="en-US"/>
           </a:p>
@@ -2737,7 +2737,7 @@
           <a:p>
             <a:fld id="{78D91B59-3308-4288-9FFB-76344938B6F4}" type="datetimeFigureOut">
               <a:rPr lang="en-US" smtClean="0"/>
-              <a:t>10/7/2013</a:t>
+              <a:t>11/9/2013</a:t>
             </a:fld>
             <a:endParaRPr lang="en-US"/>
           </a:p>
@@ -3362,7 +3362,7 @@
         </p:nvGrpSpPr>
         <p:grpSpPr>
           <a:xfrm>
-            <a:off x="1828800" y="2859613"/>
+            <a:off x="1905000" y="4267200"/>
             <a:ext cx="4444044" cy="954107"/>
             <a:chOff x="1828800" y="2859613"/>
             <a:chExt cx="4444044" cy="954107"/>
@@ -3406,7 +3406,7 @@
                   </a:solidFill>
                   <a:latin typeface="Serpentine-Bold-Bold" pitchFamily="2" charset="0"/>
                 </a:rPr>
-                <a:t>V0.9.7</a:t>
+                <a:t>V0.9.8</a:t>
               </a:r>
               <a:endParaRPr lang="en-US" sz="3600" i="1" dirty="0" smtClean="0">
                 <a:solidFill>
@@ -3479,6 +3479,182 @@
           </p:txBody>
         </p:sp>
       </p:grpSp>
+      <p:grpSp>
+        <p:nvGrpSpPr>
+          <p:cNvPr id="5" name="Group 4"/>
+          <p:cNvGrpSpPr/>
+          <p:nvPr/>
+        </p:nvGrpSpPr>
+        <p:grpSpPr>
+          <a:xfrm>
+            <a:off x="1828800" y="1533724"/>
+            <a:ext cx="4444044" cy="954107"/>
+            <a:chOff x="1828800" y="2859613"/>
+            <a:chExt cx="4444044" cy="954107"/>
+          </a:xfrm>
+        </p:grpSpPr>
+        <p:sp>
+          <p:nvSpPr>
+            <p:cNvPr id="6" name="TextBox 5"/>
+            <p:cNvSpPr txBox="1"/>
+            <p:nvPr/>
+          </p:nvSpPr>
+          <p:spPr>
+            <a:xfrm>
+              <a:off x="1828800" y="2859613"/>
+              <a:ext cx="4187365" cy="954107"/>
+            </a:xfrm>
+            <a:prstGeom prst="rect">
+              <a:avLst/>
+            </a:prstGeom>
+            <a:noFill/>
+          </p:spPr>
+          <p:txBody>
+            <a:bodyPr wrap="none" rtlCol="0">
+              <a:spAutoFit/>
+            </a:bodyPr>
+            <a:lstStyle/>
+            <a:p>
+              <a:r>
+                <a:rPr lang="en-US" sz="3600" i="1" dirty="0" smtClean="0">
+                  <a:solidFill>
+                    <a:srgbClr val="243C9B"/>
+                  </a:solidFill>
+                  <a:latin typeface="Serpentine-Bold-Bold" pitchFamily="2" charset="0"/>
+                </a:rPr>
+                <a:t>HPX V0.9.7</a:t>
+              </a:r>
+            </a:p>
+            <a:p>
+              <a:r>
+                <a:rPr lang="en-US" sz="2000" i="1" dirty="0" smtClean="0">
+                  <a:solidFill>
+                    <a:srgbClr val="243C9B"/>
+                  </a:solidFill>
+                  <a:latin typeface="Serpentine-Bold-Bold" pitchFamily="2" charset="0"/>
+                </a:rPr>
+                <a:t>High Performance ParalleX</a:t>
+              </a:r>
+              <a:endParaRPr lang="en-US" sz="2000" i="1" dirty="0">
+                <a:solidFill>
+                  <a:srgbClr val="243C9B"/>
+                </a:solidFill>
+                <a:latin typeface="Serpentine-Bold-Bold" pitchFamily="2" charset="0"/>
+              </a:endParaRPr>
+            </a:p>
+          </p:txBody>
+        </p:sp>
+        <p:sp>
+          <p:nvSpPr>
+            <p:cNvPr id="7" name="TextBox 6"/>
+            <p:cNvSpPr txBox="1"/>
+            <p:nvPr/>
+          </p:nvSpPr>
+          <p:spPr>
+            <a:xfrm>
+              <a:off x="4901244" y="3070156"/>
+              <a:ext cx="1371600" cy="400110"/>
+            </a:xfrm>
+            <a:prstGeom prst="rect">
+              <a:avLst/>
+            </a:prstGeom>
+            <a:noFill/>
+          </p:spPr>
+          <p:txBody>
+            <a:bodyPr wrap="square" rtlCol="0">
+              <a:spAutoFit/>
+            </a:bodyPr>
+            <a:lstStyle/>
+            <a:p>
+              <a:r>
+                <a:rPr lang="en-US" sz="2000" dirty="0" smtClean="0">
+                  <a:solidFill>
+                    <a:srgbClr val="C00000">
+                      <a:alpha val="90000"/>
+                    </a:srgbClr>
+                  </a:solidFill>
+                  <a:latin typeface="Arial Black" panose="020B0A04020102020204" pitchFamily="34" charset="0"/>
+                </a:rPr>
+                <a:t>DRAFT</a:t>
+              </a:r>
+              <a:endParaRPr lang="en-US" sz="2000" dirty="0">
+                <a:solidFill>
+                  <a:srgbClr val="C00000">
+                    <a:alpha val="90000"/>
+                  </a:srgbClr>
+                </a:solidFill>
+                <a:latin typeface="Arial Black" panose="020B0A04020102020204" pitchFamily="34" charset="0"/>
+              </a:endParaRPr>
+            </a:p>
+          </p:txBody>
+        </p:sp>
+      </p:grpSp>
+      <p:sp>
+        <p:nvSpPr>
+          <p:cNvPr id="8" name="TextBox 7"/>
+          <p:cNvSpPr txBox="1"/>
+          <p:nvPr/>
+        </p:nvSpPr>
+        <p:spPr>
+          <a:xfrm>
+            <a:off x="1828800" y="2727277"/>
+            <a:ext cx="4187365" cy="1138773"/>
+          </a:xfrm>
+          <a:prstGeom prst="rect">
+            <a:avLst/>
+          </a:prstGeom>
+          <a:noFill/>
+        </p:spPr>
+        <p:txBody>
+          <a:bodyPr wrap="none" rtlCol="0">
+            <a:spAutoFit/>
+          </a:bodyPr>
+          <a:lstStyle/>
+          <a:p>
+            <a:r>
+              <a:rPr lang="en-US" sz="4800" i="1" dirty="0" smtClean="0">
+                <a:solidFill>
+                  <a:srgbClr val="243C9B"/>
+                </a:solidFill>
+                <a:latin typeface="Serpentine-Bold-Bold" pitchFamily="2" charset="0"/>
+              </a:rPr>
+              <a:t>HPX </a:t>
+            </a:r>
+            <a:r>
+              <a:rPr lang="en-US" sz="4800" i="1" dirty="0" smtClean="0">
+                <a:solidFill>
+                  <a:srgbClr val="243C9B"/>
+                </a:solidFill>
+                <a:latin typeface="Serpentine-Bold-Bold" pitchFamily="2" charset="0"/>
+              </a:rPr>
+              <a:t>V0.9.7</a:t>
+            </a:r>
+            <a:endParaRPr lang="en-US" sz="4800" i="1" dirty="0" smtClean="0">
+              <a:solidFill>
+                <a:srgbClr val="243C9B"/>
+              </a:solidFill>
+              <a:latin typeface="Serpentine-Bold-Bold" pitchFamily="2" charset="0"/>
+            </a:endParaRPr>
+          </a:p>
+          <a:p>
+            <a:r>
+              <a:rPr lang="en-US" sz="2000" i="1" dirty="0" smtClean="0">
+                <a:solidFill>
+                  <a:srgbClr val="243C9B"/>
+                </a:solidFill>
+                <a:latin typeface="Serpentine-Bold-Bold" pitchFamily="2" charset="0"/>
+              </a:rPr>
+              <a:t>High Performance ParalleX</a:t>
+            </a:r>
+            <a:endParaRPr lang="en-US" sz="2000" i="1" dirty="0">
+              <a:solidFill>
+                <a:srgbClr val="243C9B"/>
+              </a:solidFill>
+              <a:latin typeface="Serpentine-Bold-Bold" pitchFamily="2" charset="0"/>
+            </a:endParaRPr>
+          </a:p>
+        </p:txBody>
+      </p:sp>
     </p:spTree>
     <p:extLst>
       <p:ext uri="{BB962C8B-B14F-4D97-AF65-F5344CB8AC3E}">

</xml_diff>

<commit_message>
Adding new logo images
</commit_message>
<xml_diff>
--- a/docs/version.pptx
+++ b/docs/version.pptx
@@ -7,6 +7,7 @@
   <p:sldIdLst>
     <p:sldId id="256" r:id="rId2"/>
     <p:sldId id="257" r:id="rId3"/>
+    <p:sldId id="258" r:id="rId4"/>
   </p:sldIdLst>
   <p:sldSz cx="9144000" cy="6858000" type="screen4x3"/>
   <p:notesSz cx="6858000" cy="9144000"/>
@@ -305,7 +306,7 @@
           <a:p>
             <a:fld id="{78D91B59-3308-4288-9FFB-76344938B6F4}" type="datetimeFigureOut">
               <a:rPr lang="en-US" smtClean="0"/>
-              <a:t>11/9/2013</a:t>
+              <a:t>3/14/2014</a:t>
             </a:fld>
             <a:endParaRPr lang="en-US"/>
           </a:p>
@@ -475,7 +476,7 @@
           <a:p>
             <a:fld id="{78D91B59-3308-4288-9FFB-76344938B6F4}" type="datetimeFigureOut">
               <a:rPr lang="en-US" smtClean="0"/>
-              <a:t>11/9/2013</a:t>
+              <a:t>3/14/2014</a:t>
             </a:fld>
             <a:endParaRPr lang="en-US"/>
           </a:p>
@@ -655,7 +656,7 @@
           <a:p>
             <a:fld id="{78D91B59-3308-4288-9FFB-76344938B6F4}" type="datetimeFigureOut">
               <a:rPr lang="en-US" smtClean="0"/>
-              <a:t>11/9/2013</a:t>
+              <a:t>3/14/2014</a:t>
             </a:fld>
             <a:endParaRPr lang="en-US"/>
           </a:p>
@@ -825,7 +826,7 @@
           <a:p>
             <a:fld id="{78D91B59-3308-4288-9FFB-76344938B6F4}" type="datetimeFigureOut">
               <a:rPr lang="en-US" smtClean="0"/>
-              <a:t>11/9/2013</a:t>
+              <a:t>3/14/2014</a:t>
             </a:fld>
             <a:endParaRPr lang="en-US"/>
           </a:p>
@@ -1071,7 +1072,7 @@
           <a:p>
             <a:fld id="{78D91B59-3308-4288-9FFB-76344938B6F4}" type="datetimeFigureOut">
               <a:rPr lang="en-US" smtClean="0"/>
-              <a:t>11/9/2013</a:t>
+              <a:t>3/14/2014</a:t>
             </a:fld>
             <a:endParaRPr lang="en-US"/>
           </a:p>
@@ -1359,7 +1360,7 @@
           <a:p>
             <a:fld id="{78D91B59-3308-4288-9FFB-76344938B6F4}" type="datetimeFigureOut">
               <a:rPr lang="en-US" smtClean="0"/>
-              <a:t>11/9/2013</a:t>
+              <a:t>3/14/2014</a:t>
             </a:fld>
             <a:endParaRPr lang="en-US"/>
           </a:p>
@@ -1781,7 +1782,7 @@
           <a:p>
             <a:fld id="{78D91B59-3308-4288-9FFB-76344938B6F4}" type="datetimeFigureOut">
               <a:rPr lang="en-US" smtClean="0"/>
-              <a:t>11/9/2013</a:t>
+              <a:t>3/14/2014</a:t>
             </a:fld>
             <a:endParaRPr lang="en-US"/>
           </a:p>
@@ -1899,7 +1900,7 @@
           <a:p>
             <a:fld id="{78D91B59-3308-4288-9FFB-76344938B6F4}" type="datetimeFigureOut">
               <a:rPr lang="en-US" smtClean="0"/>
-              <a:t>11/9/2013</a:t>
+              <a:t>3/14/2014</a:t>
             </a:fld>
             <a:endParaRPr lang="en-US"/>
           </a:p>
@@ -1994,7 +1995,7 @@
           <a:p>
             <a:fld id="{78D91B59-3308-4288-9FFB-76344938B6F4}" type="datetimeFigureOut">
               <a:rPr lang="en-US" smtClean="0"/>
-              <a:t>11/9/2013</a:t>
+              <a:t>3/14/2014</a:t>
             </a:fld>
             <a:endParaRPr lang="en-US"/>
           </a:p>
@@ -2271,7 +2272,7 @@
           <a:p>
             <a:fld id="{78D91B59-3308-4288-9FFB-76344938B6F4}" type="datetimeFigureOut">
               <a:rPr lang="en-US" smtClean="0"/>
-              <a:t>11/9/2013</a:t>
+              <a:t>3/14/2014</a:t>
             </a:fld>
             <a:endParaRPr lang="en-US"/>
           </a:p>
@@ -2524,7 +2525,7 @@
           <a:p>
             <a:fld id="{78D91B59-3308-4288-9FFB-76344938B6F4}" type="datetimeFigureOut">
               <a:rPr lang="en-US" smtClean="0"/>
-              <a:t>11/9/2013</a:t>
+              <a:t>3/14/2014</a:t>
             </a:fld>
             <a:endParaRPr lang="en-US"/>
           </a:p>
@@ -2737,7 +2738,7 @@
           <a:p>
             <a:fld id="{78D91B59-3308-4288-9FFB-76344938B6F4}" type="datetimeFigureOut">
               <a:rPr lang="en-US" smtClean="0"/>
-              <a:t>11/9/2013</a:t>
+              <a:t>3/14/2014</a:t>
             </a:fld>
             <a:endParaRPr lang="en-US"/>
           </a:p>
@@ -3397,6 +3398,307 @@
                   </a:solidFill>
                   <a:latin typeface="Serpentine-Bold-Bold" pitchFamily="2" charset="0"/>
                 </a:rPr>
+                <a:t>HPX V0.9.8</a:t>
+              </a:r>
+            </a:p>
+            <a:p>
+              <a:r>
+                <a:rPr lang="en-US" sz="2000" i="1" dirty="0" smtClean="0">
+                  <a:solidFill>
+                    <a:srgbClr val="243C9B"/>
+                  </a:solidFill>
+                  <a:latin typeface="Serpentine-Bold-Bold" pitchFamily="2" charset="0"/>
+                </a:rPr>
+                <a:t>High Performance ParalleX</a:t>
+              </a:r>
+              <a:endParaRPr lang="en-US" sz="2000" i="1" dirty="0">
+                <a:solidFill>
+                  <a:srgbClr val="243C9B"/>
+                </a:solidFill>
+                <a:latin typeface="Serpentine-Bold-Bold" pitchFamily="2" charset="0"/>
+              </a:endParaRPr>
+            </a:p>
+          </p:txBody>
+        </p:sp>
+        <p:sp>
+          <p:nvSpPr>
+            <p:cNvPr id="3" name="TextBox 2"/>
+            <p:cNvSpPr txBox="1"/>
+            <p:nvPr/>
+          </p:nvSpPr>
+          <p:spPr>
+            <a:xfrm>
+              <a:off x="4901244" y="3070156"/>
+              <a:ext cx="1371600" cy="400110"/>
+            </a:xfrm>
+            <a:prstGeom prst="rect">
+              <a:avLst/>
+            </a:prstGeom>
+            <a:noFill/>
+          </p:spPr>
+          <p:txBody>
+            <a:bodyPr wrap="square" rtlCol="0">
+              <a:spAutoFit/>
+            </a:bodyPr>
+            <a:lstStyle/>
+            <a:p>
+              <a:r>
+                <a:rPr lang="en-US" sz="2000" dirty="0" smtClean="0">
+                  <a:solidFill>
+                    <a:srgbClr val="C00000">
+                      <a:alpha val="90000"/>
+                    </a:srgbClr>
+                  </a:solidFill>
+                  <a:latin typeface="Arial Black" panose="020B0A04020102020204" pitchFamily="34" charset="0"/>
+                </a:rPr>
+                <a:t>DRAFT</a:t>
+              </a:r>
+              <a:endParaRPr lang="en-US" sz="2000" dirty="0">
+                <a:solidFill>
+                  <a:srgbClr val="C00000">
+                    <a:alpha val="90000"/>
+                  </a:srgbClr>
+                </a:solidFill>
+                <a:latin typeface="Arial Black" panose="020B0A04020102020204" pitchFamily="34" charset="0"/>
+              </a:endParaRPr>
+            </a:p>
+          </p:txBody>
+        </p:sp>
+      </p:grpSp>
+      <p:grpSp>
+        <p:nvGrpSpPr>
+          <p:cNvPr id="5" name="Group 4"/>
+          <p:cNvGrpSpPr/>
+          <p:nvPr/>
+        </p:nvGrpSpPr>
+        <p:grpSpPr>
+          <a:xfrm>
+            <a:off x="1828800" y="1533724"/>
+            <a:ext cx="4444044" cy="954107"/>
+            <a:chOff x="1828800" y="2859613"/>
+            <a:chExt cx="4444044" cy="954107"/>
+          </a:xfrm>
+        </p:grpSpPr>
+        <p:sp>
+          <p:nvSpPr>
+            <p:cNvPr id="6" name="TextBox 5"/>
+            <p:cNvSpPr txBox="1"/>
+            <p:nvPr/>
+          </p:nvSpPr>
+          <p:spPr>
+            <a:xfrm>
+              <a:off x="1828800" y="2859613"/>
+              <a:ext cx="4187365" cy="954107"/>
+            </a:xfrm>
+            <a:prstGeom prst="rect">
+              <a:avLst/>
+            </a:prstGeom>
+            <a:noFill/>
+          </p:spPr>
+          <p:txBody>
+            <a:bodyPr wrap="none" rtlCol="0">
+              <a:spAutoFit/>
+            </a:bodyPr>
+            <a:lstStyle/>
+            <a:p>
+              <a:r>
+                <a:rPr lang="en-US" sz="3600" i="1" dirty="0" smtClean="0">
+                  <a:solidFill>
+                    <a:srgbClr val="243C9B"/>
+                  </a:solidFill>
+                  <a:latin typeface="Serpentine-Bold-Bold" pitchFamily="2" charset="0"/>
+                </a:rPr>
+                <a:t>HPX V0.9.7</a:t>
+              </a:r>
+            </a:p>
+            <a:p>
+              <a:r>
+                <a:rPr lang="en-US" sz="2000" i="1" dirty="0" smtClean="0">
+                  <a:solidFill>
+                    <a:srgbClr val="243C9B"/>
+                  </a:solidFill>
+                  <a:latin typeface="Serpentine-Bold-Bold" pitchFamily="2" charset="0"/>
+                </a:rPr>
+                <a:t>High Performance ParalleX</a:t>
+              </a:r>
+              <a:endParaRPr lang="en-US" sz="2000" i="1" dirty="0">
+                <a:solidFill>
+                  <a:srgbClr val="243C9B"/>
+                </a:solidFill>
+                <a:latin typeface="Serpentine-Bold-Bold" pitchFamily="2" charset="0"/>
+              </a:endParaRPr>
+            </a:p>
+          </p:txBody>
+        </p:sp>
+        <p:sp>
+          <p:nvSpPr>
+            <p:cNvPr id="7" name="TextBox 6"/>
+            <p:cNvSpPr txBox="1"/>
+            <p:nvPr/>
+          </p:nvSpPr>
+          <p:spPr>
+            <a:xfrm>
+              <a:off x="4901244" y="3070156"/>
+              <a:ext cx="1371600" cy="400110"/>
+            </a:xfrm>
+            <a:prstGeom prst="rect">
+              <a:avLst/>
+            </a:prstGeom>
+            <a:noFill/>
+          </p:spPr>
+          <p:txBody>
+            <a:bodyPr wrap="square" rtlCol="0">
+              <a:spAutoFit/>
+            </a:bodyPr>
+            <a:lstStyle/>
+            <a:p>
+              <a:r>
+                <a:rPr lang="en-US" sz="2000" dirty="0" smtClean="0">
+                  <a:solidFill>
+                    <a:srgbClr val="C00000">
+                      <a:alpha val="90000"/>
+                    </a:srgbClr>
+                  </a:solidFill>
+                  <a:latin typeface="Arial Black" panose="020B0A04020102020204" pitchFamily="34" charset="0"/>
+                </a:rPr>
+                <a:t>DRAFT</a:t>
+              </a:r>
+              <a:endParaRPr lang="en-US" sz="2000" dirty="0">
+                <a:solidFill>
+                  <a:srgbClr val="C00000">
+                    <a:alpha val="90000"/>
+                  </a:srgbClr>
+                </a:solidFill>
+                <a:latin typeface="Arial Black" panose="020B0A04020102020204" pitchFamily="34" charset="0"/>
+              </a:endParaRPr>
+            </a:p>
+          </p:txBody>
+        </p:sp>
+      </p:grpSp>
+      <p:sp>
+        <p:nvSpPr>
+          <p:cNvPr id="8" name="TextBox 7"/>
+          <p:cNvSpPr txBox="1"/>
+          <p:nvPr/>
+        </p:nvSpPr>
+        <p:spPr>
+          <a:xfrm>
+            <a:off x="1828800" y="2727277"/>
+            <a:ext cx="4187365" cy="1138773"/>
+          </a:xfrm>
+          <a:prstGeom prst="rect">
+            <a:avLst/>
+          </a:prstGeom>
+          <a:noFill/>
+        </p:spPr>
+        <p:txBody>
+          <a:bodyPr wrap="none" rtlCol="0">
+            <a:spAutoFit/>
+          </a:bodyPr>
+          <a:lstStyle/>
+          <a:p>
+            <a:r>
+              <a:rPr lang="en-US" sz="4800" i="1" dirty="0" smtClean="0">
+                <a:solidFill>
+                  <a:srgbClr val="243C9B"/>
+                </a:solidFill>
+                <a:latin typeface="Serpentine-Bold-Bold" pitchFamily="2" charset="0"/>
+              </a:rPr>
+              <a:t>HPX V0.9.7</a:t>
+            </a:r>
+          </a:p>
+          <a:p>
+            <a:r>
+              <a:rPr lang="en-US" sz="2000" i="1" dirty="0" smtClean="0">
+                <a:solidFill>
+                  <a:srgbClr val="243C9B"/>
+                </a:solidFill>
+                <a:latin typeface="Serpentine-Bold-Bold" pitchFamily="2" charset="0"/>
+              </a:rPr>
+              <a:t>High Performance ParalleX</a:t>
+            </a:r>
+            <a:endParaRPr lang="en-US" sz="2000" i="1" dirty="0">
+              <a:solidFill>
+                <a:srgbClr val="243C9B"/>
+              </a:solidFill>
+              <a:latin typeface="Serpentine-Bold-Bold" pitchFamily="2" charset="0"/>
+            </a:endParaRPr>
+          </a:p>
+        </p:txBody>
+      </p:sp>
+    </p:spTree>
+    <p:extLst>
+      <p:ext uri="{BB962C8B-B14F-4D97-AF65-F5344CB8AC3E}">
+        <p14:creationId xmlns:p14="http://schemas.microsoft.com/office/powerpoint/2010/main" val="1725541328"/>
+      </p:ext>
+    </p:extLst>
+  </p:cSld>
+  <p:clrMapOvr>
+    <a:masterClrMapping/>
+  </p:clrMapOvr>
+</p:sld>
+</file>
+
+<file path=ppt/slides/slide3.xml><?xml version="1.0" encoding="utf-8"?>
+<p:sld xmlns:a="http://schemas.openxmlformats.org/drawingml/2006/main" xmlns:r="http://schemas.openxmlformats.org/officeDocument/2006/relationships" xmlns:p="http://schemas.openxmlformats.org/presentationml/2006/main">
+  <p:cSld>
+    <p:spTree>
+      <p:nvGrpSpPr>
+        <p:cNvPr id="1" name=""/>
+        <p:cNvGrpSpPr/>
+        <p:nvPr/>
+      </p:nvGrpSpPr>
+      <p:grpSpPr>
+        <a:xfrm>
+          <a:off x="0" y="0"/>
+          <a:ext cx="0" cy="0"/>
+          <a:chOff x="0" y="0"/>
+          <a:chExt cx="0" cy="0"/>
+        </a:xfrm>
+      </p:grpSpPr>
+      <p:grpSp>
+        <p:nvGrpSpPr>
+          <p:cNvPr id="4" name="Group 3"/>
+          <p:cNvGrpSpPr/>
+          <p:nvPr/>
+        </p:nvGrpSpPr>
+        <p:grpSpPr>
+          <a:xfrm>
+            <a:off x="1905000" y="4267200"/>
+            <a:ext cx="4444044" cy="954107"/>
+            <a:chOff x="1828800" y="2859613"/>
+            <a:chExt cx="4444044" cy="954107"/>
+          </a:xfrm>
+        </p:grpSpPr>
+        <p:sp>
+          <p:nvSpPr>
+            <p:cNvPr id="2" name="TextBox 1"/>
+            <p:cNvSpPr txBox="1"/>
+            <p:nvPr/>
+          </p:nvSpPr>
+          <p:spPr>
+            <a:xfrm>
+              <a:off x="1828800" y="2859613"/>
+              <a:ext cx="4187365" cy="954107"/>
+            </a:xfrm>
+            <a:prstGeom prst="rect">
+              <a:avLst/>
+            </a:prstGeom>
+            <a:noFill/>
+          </p:spPr>
+          <p:txBody>
+            <a:bodyPr wrap="none" rtlCol="0">
+              <a:spAutoFit/>
+            </a:bodyPr>
+            <a:lstStyle/>
+            <a:p>
+              <a:r>
+                <a:rPr lang="en-US" sz="3600" i="1" dirty="0" smtClean="0">
+                  <a:solidFill>
+                    <a:srgbClr val="243C9B"/>
+                  </a:solidFill>
+                  <a:latin typeface="Serpentine-Bold-Bold" pitchFamily="2" charset="0"/>
+                </a:rPr>
                 <a:t>HPX </a:t>
               </a:r>
               <a:r>
@@ -3406,7 +3708,7 @@
                   </a:solidFill>
                   <a:latin typeface="Serpentine-Bold-Bold" pitchFamily="2" charset="0"/>
                 </a:rPr>
-                <a:t>V0.9.8</a:t>
+                <a:t>V0.9.9</a:t>
               </a:r>
               <a:endParaRPr lang="en-US" sz="3600" i="1" dirty="0" smtClean="0">
                 <a:solidFill>
@@ -3627,7 +3929,7 @@
                 </a:solidFill>
                 <a:latin typeface="Serpentine-Bold-Bold" pitchFamily="2" charset="0"/>
               </a:rPr>
-              <a:t>V0.9.7</a:t>
+              <a:t>V0.9.8</a:t>
             </a:r>
             <a:endParaRPr lang="en-US" sz="4800" i="1" dirty="0" smtClean="0">
               <a:solidFill>
@@ -3658,7 +3960,7 @@
     </p:spTree>
     <p:extLst>
       <p:ext uri="{BB962C8B-B14F-4D97-AF65-F5344CB8AC3E}">
-        <p14:creationId xmlns:p14="http://schemas.microsoft.com/office/powerpoint/2010/main" val="1725541328"/>
+        <p14:creationId xmlns:p14="http://schemas.microsoft.com/office/powerpoint/2010/main" val="2826866310"/>
       </p:ext>
     </p:extLst>
   </p:cSld>

</xml_diff>

<commit_message>
Adding logos for 0.9.9 and 0.9.10 (draft)
</commit_message>
<xml_diff>
--- a/docs/version.pptx
+++ b/docs/version.pptx
@@ -8,6 +8,7 @@
     <p:sldId id="256" r:id="rId2"/>
     <p:sldId id="257" r:id="rId3"/>
     <p:sldId id="258" r:id="rId4"/>
+    <p:sldId id="259" r:id="rId5"/>
   </p:sldIdLst>
   <p:sldSz cx="9144000" cy="6858000" type="screen4x3"/>
   <p:notesSz cx="6858000" cy="9144000"/>
@@ -306,7 +307,7 @@
           <a:p>
             <a:fld id="{78D91B59-3308-4288-9FFB-76344938B6F4}" type="datetimeFigureOut">
               <a:rPr lang="en-US" smtClean="0"/>
-              <a:t>3/14/2014</a:t>
+              <a:t>9/14/2014</a:t>
             </a:fld>
             <a:endParaRPr lang="en-US"/>
           </a:p>
@@ -476,7 +477,7 @@
           <a:p>
             <a:fld id="{78D91B59-3308-4288-9FFB-76344938B6F4}" type="datetimeFigureOut">
               <a:rPr lang="en-US" smtClean="0"/>
-              <a:t>3/14/2014</a:t>
+              <a:t>9/14/2014</a:t>
             </a:fld>
             <a:endParaRPr lang="en-US"/>
           </a:p>
@@ -656,7 +657,7 @@
           <a:p>
             <a:fld id="{78D91B59-3308-4288-9FFB-76344938B6F4}" type="datetimeFigureOut">
               <a:rPr lang="en-US" smtClean="0"/>
-              <a:t>3/14/2014</a:t>
+              <a:t>9/14/2014</a:t>
             </a:fld>
             <a:endParaRPr lang="en-US"/>
           </a:p>
@@ -826,7 +827,7 @@
           <a:p>
             <a:fld id="{78D91B59-3308-4288-9FFB-76344938B6F4}" type="datetimeFigureOut">
               <a:rPr lang="en-US" smtClean="0"/>
-              <a:t>3/14/2014</a:t>
+              <a:t>9/14/2014</a:t>
             </a:fld>
             <a:endParaRPr lang="en-US"/>
           </a:p>
@@ -1072,7 +1073,7 @@
           <a:p>
             <a:fld id="{78D91B59-3308-4288-9FFB-76344938B6F4}" type="datetimeFigureOut">
               <a:rPr lang="en-US" smtClean="0"/>
-              <a:t>3/14/2014</a:t>
+              <a:t>9/14/2014</a:t>
             </a:fld>
             <a:endParaRPr lang="en-US"/>
           </a:p>
@@ -1360,7 +1361,7 @@
           <a:p>
             <a:fld id="{78D91B59-3308-4288-9FFB-76344938B6F4}" type="datetimeFigureOut">
               <a:rPr lang="en-US" smtClean="0"/>
-              <a:t>3/14/2014</a:t>
+              <a:t>9/14/2014</a:t>
             </a:fld>
             <a:endParaRPr lang="en-US"/>
           </a:p>
@@ -1782,7 +1783,7 @@
           <a:p>
             <a:fld id="{78D91B59-3308-4288-9FFB-76344938B6F4}" type="datetimeFigureOut">
               <a:rPr lang="en-US" smtClean="0"/>
-              <a:t>3/14/2014</a:t>
+              <a:t>9/14/2014</a:t>
             </a:fld>
             <a:endParaRPr lang="en-US"/>
           </a:p>
@@ -1900,7 +1901,7 @@
           <a:p>
             <a:fld id="{78D91B59-3308-4288-9FFB-76344938B6F4}" type="datetimeFigureOut">
               <a:rPr lang="en-US" smtClean="0"/>
-              <a:t>3/14/2014</a:t>
+              <a:t>9/14/2014</a:t>
             </a:fld>
             <a:endParaRPr lang="en-US"/>
           </a:p>
@@ -1995,7 +1996,7 @@
           <a:p>
             <a:fld id="{78D91B59-3308-4288-9FFB-76344938B6F4}" type="datetimeFigureOut">
               <a:rPr lang="en-US" smtClean="0"/>
-              <a:t>3/14/2014</a:t>
+              <a:t>9/14/2014</a:t>
             </a:fld>
             <a:endParaRPr lang="en-US"/>
           </a:p>
@@ -2272,7 +2273,7 @@
           <a:p>
             <a:fld id="{78D91B59-3308-4288-9FFB-76344938B6F4}" type="datetimeFigureOut">
               <a:rPr lang="en-US" smtClean="0"/>
-              <a:t>3/14/2014</a:t>
+              <a:t>9/14/2014</a:t>
             </a:fld>
             <a:endParaRPr lang="en-US"/>
           </a:p>
@@ -2525,7 +2526,7 @@
           <a:p>
             <a:fld id="{78D91B59-3308-4288-9FFB-76344938B6F4}" type="datetimeFigureOut">
               <a:rPr lang="en-US" smtClean="0"/>
-              <a:t>3/14/2014</a:t>
+              <a:t>9/14/2014</a:t>
             </a:fld>
             <a:endParaRPr lang="en-US"/>
           </a:p>
@@ -2738,7 +2739,7 @@
           <a:p>
             <a:fld id="{78D91B59-3308-4288-9FFB-76344938B6F4}" type="datetimeFigureOut">
               <a:rPr lang="en-US" smtClean="0"/>
-              <a:t>3/14/2014</a:t>
+              <a:t>9/14/2014</a:t>
             </a:fld>
             <a:endParaRPr lang="en-US"/>
           </a:p>
@@ -3140,7 +3141,7 @@
                 <a:solidFill>
                   <a:srgbClr val="243C9B"/>
                 </a:solidFill>
-                <a:latin typeface="Serpentine-Bold-Bold" pitchFamily="2" charset="0"/>
+                <a:latin typeface="Serpentine-Bold" panose="02000500000000000000" pitchFamily="2" charset="0"/>
               </a:rPr>
               <a:t>HPX V0.9.5</a:t>
             </a:r>
@@ -3151,7 +3152,7 @@
                 <a:solidFill>
                   <a:srgbClr val="243C9B"/>
                 </a:solidFill>
-                <a:latin typeface="Serpentine-Bold-Bold" pitchFamily="2" charset="0"/>
+                <a:latin typeface="Serpentine-Bold" panose="02000500000000000000" pitchFamily="2" charset="0"/>
               </a:rPr>
               <a:t>High Performance ParalleX</a:t>
             </a:r>
@@ -3159,7 +3160,7 @@
               <a:solidFill>
                 <a:srgbClr val="243C9B"/>
               </a:solidFill>
-              <a:latin typeface="Serpentine-Bold-Bold" pitchFamily="2" charset="0"/>
+              <a:latin typeface="Serpentine-Bold" panose="02000500000000000000" pitchFamily="2" charset="0"/>
             </a:endParaRPr>
           </a:p>
         </p:txBody>
@@ -3191,7 +3192,7 @@
                 <a:solidFill>
                   <a:srgbClr val="243C9B"/>
                 </a:solidFill>
-                <a:latin typeface="Serpentine-Bold-Bold" pitchFamily="2" charset="0"/>
+                <a:latin typeface="Serpentine-Bold" panose="02000500000000000000" pitchFamily="2" charset="0"/>
               </a:rPr>
               <a:t>HPX V0.9.6</a:t>
             </a:r>
@@ -3202,7 +3203,7 @@
                 <a:solidFill>
                   <a:srgbClr val="243C9B"/>
                 </a:solidFill>
-                <a:latin typeface="Serpentine-Bold-Bold" pitchFamily="2" charset="0"/>
+                <a:latin typeface="Serpentine-Bold" panose="02000500000000000000" pitchFamily="2" charset="0"/>
               </a:rPr>
               <a:t>High Performance ParalleX</a:t>
             </a:r>
@@ -3210,7 +3211,7 @@
               <a:solidFill>
                 <a:srgbClr val="243C9B"/>
               </a:solidFill>
-              <a:latin typeface="Serpentine-Bold-Bold" pitchFamily="2" charset="0"/>
+              <a:latin typeface="Serpentine-Bold" panose="02000500000000000000" pitchFamily="2" charset="0"/>
             </a:endParaRPr>
           </a:p>
         </p:txBody>
@@ -3256,7 +3257,7 @@
                   <a:solidFill>
                     <a:srgbClr val="243C9B"/>
                   </a:solidFill>
-                  <a:latin typeface="Serpentine-Bold-Bold" pitchFamily="2" charset="0"/>
+                  <a:latin typeface="Serpentine-Bold" panose="02000500000000000000" pitchFamily="2" charset="0"/>
                 </a:rPr>
                 <a:t>HPX V1.0</a:t>
               </a:r>
@@ -3267,7 +3268,7 @@
                   <a:solidFill>
                     <a:srgbClr val="243C9B"/>
                   </a:solidFill>
-                  <a:latin typeface="Serpentine-Bold-Bold" pitchFamily="2" charset="0"/>
+                  <a:latin typeface="Serpentine-Bold" panose="02000500000000000000" pitchFamily="2" charset="0"/>
                 </a:rPr>
                 <a:t>High Performance ParalleX</a:t>
               </a:r>
@@ -3275,7 +3276,7 @@
                 <a:solidFill>
                   <a:srgbClr val="243C9B"/>
                 </a:solidFill>
-                <a:latin typeface="Serpentine-Bold-Bold" pitchFamily="2" charset="0"/>
+                <a:latin typeface="Serpentine-Bold" panose="02000500000000000000" pitchFamily="2" charset="0"/>
               </a:endParaRPr>
             </a:p>
           </p:txBody>
@@ -3335,6 +3336,13 @@
   <p:clrMapOvr>
     <a:masterClrMapping/>
   </p:clrMapOvr>
+  <p:timing>
+    <p:tnLst>
+      <p:par>
+        <p:cTn id="1" dur="indefinite" restart="never" nodeType="tmRoot"/>
+      </p:par>
+    </p:tnLst>
+  </p:timing>
 </p:sld>
 </file>
 
@@ -3396,7 +3404,7 @@
                   <a:solidFill>
                     <a:srgbClr val="243C9B"/>
                   </a:solidFill>
-                  <a:latin typeface="Serpentine-Bold-Bold" pitchFamily="2" charset="0"/>
+                  <a:latin typeface="Serpentine-Bold" panose="02000500000000000000" pitchFamily="2" charset="0"/>
                 </a:rPr>
                 <a:t>HPX V0.9.8</a:t>
               </a:r>
@@ -3407,7 +3415,7 @@
                   <a:solidFill>
                     <a:srgbClr val="243C9B"/>
                   </a:solidFill>
-                  <a:latin typeface="Serpentine-Bold-Bold" pitchFamily="2" charset="0"/>
+                  <a:latin typeface="Serpentine-Bold" panose="02000500000000000000" pitchFamily="2" charset="0"/>
                 </a:rPr>
                 <a:t>High Performance ParalleX</a:t>
               </a:r>
@@ -3415,7 +3423,7 @@
                 <a:solidFill>
                   <a:srgbClr val="243C9B"/>
                 </a:solidFill>
-                <a:latin typeface="Serpentine-Bold-Bold" pitchFamily="2" charset="0"/>
+                <a:latin typeface="Serpentine-Bold" panose="02000500000000000000" pitchFamily="2" charset="0"/>
               </a:endParaRPr>
             </a:p>
           </p:txBody>
@@ -3506,7 +3514,7 @@
                   <a:solidFill>
                     <a:srgbClr val="243C9B"/>
                   </a:solidFill>
-                  <a:latin typeface="Serpentine-Bold-Bold" pitchFamily="2" charset="0"/>
+                  <a:latin typeface="Serpentine-Bold" panose="02000500000000000000" pitchFamily="2" charset="0"/>
                 </a:rPr>
                 <a:t>HPX V0.9.7</a:t>
               </a:r>
@@ -3517,7 +3525,7 @@
                   <a:solidFill>
                     <a:srgbClr val="243C9B"/>
                   </a:solidFill>
-                  <a:latin typeface="Serpentine-Bold-Bold" pitchFamily="2" charset="0"/>
+                  <a:latin typeface="Serpentine-Bold" panose="02000500000000000000" pitchFamily="2" charset="0"/>
                 </a:rPr>
                 <a:t>High Performance ParalleX</a:t>
               </a:r>
@@ -3525,7 +3533,7 @@
                 <a:solidFill>
                   <a:srgbClr val="243C9B"/>
                 </a:solidFill>
-                <a:latin typeface="Serpentine-Bold-Bold" pitchFamily="2" charset="0"/>
+                <a:latin typeface="Serpentine-Bold" panose="02000500000000000000" pitchFamily="2" charset="0"/>
               </a:endParaRPr>
             </a:p>
           </p:txBody>
@@ -3602,7 +3610,7 @@
                 <a:solidFill>
                   <a:srgbClr val="243C9B"/>
                 </a:solidFill>
-                <a:latin typeface="Serpentine-Bold-Bold" pitchFamily="2" charset="0"/>
+                <a:latin typeface="Serpentine-Bold" panose="02000500000000000000" pitchFamily="2" charset="0"/>
               </a:rPr>
               <a:t>HPX V0.9.7</a:t>
             </a:r>
@@ -3613,7 +3621,7 @@
                 <a:solidFill>
                   <a:srgbClr val="243C9B"/>
                 </a:solidFill>
-                <a:latin typeface="Serpentine-Bold-Bold" pitchFamily="2" charset="0"/>
+                <a:latin typeface="Serpentine-Bold" panose="02000500000000000000" pitchFamily="2" charset="0"/>
               </a:rPr>
               <a:t>High Performance ParalleX</a:t>
             </a:r>
@@ -3621,7 +3629,7 @@
               <a:solidFill>
                 <a:srgbClr val="243C9B"/>
               </a:solidFill>
-              <a:latin typeface="Serpentine-Bold-Bold" pitchFamily="2" charset="0"/>
+              <a:latin typeface="Serpentine-Bold" panose="02000500000000000000" pitchFamily="2" charset="0"/>
             </a:endParaRPr>
           </a:p>
         </p:txBody>
@@ -3636,6 +3644,13 @@
   <p:clrMapOvr>
     <a:masterClrMapping/>
   </p:clrMapOvr>
+  <p:timing>
+    <p:tnLst>
+      <p:par>
+        <p:cTn id="1" dur="indefinite" restart="never" nodeType="tmRoot"/>
+      </p:par>
+    </p:tnLst>
+  </p:timing>
 </p:sld>
 </file>
 
@@ -3697,25 +3712,10 @@
                   <a:solidFill>
                     <a:srgbClr val="243C9B"/>
                   </a:solidFill>
-                  <a:latin typeface="Serpentine-Bold-Bold" pitchFamily="2" charset="0"/>
+                  <a:latin typeface="Serpentine-Bold" panose="02000500000000000000" pitchFamily="2" charset="0"/>
                 </a:rPr>
-                <a:t>HPX </a:t>
+                <a:t>HPX V0.9.9</a:t>
               </a:r>
-              <a:r>
-                <a:rPr lang="en-US" sz="3600" i="1" dirty="0" smtClean="0">
-                  <a:solidFill>
-                    <a:srgbClr val="243C9B"/>
-                  </a:solidFill>
-                  <a:latin typeface="Serpentine-Bold-Bold" pitchFamily="2" charset="0"/>
-                </a:rPr>
-                <a:t>V0.9.9</a:t>
-              </a:r>
-              <a:endParaRPr lang="en-US" sz="3600" i="1" dirty="0" smtClean="0">
-                <a:solidFill>
-                  <a:srgbClr val="243C9B"/>
-                </a:solidFill>
-                <a:latin typeface="Serpentine-Bold-Bold" pitchFamily="2" charset="0"/>
-              </a:endParaRPr>
             </a:p>
             <a:p>
               <a:r>
@@ -3723,7 +3723,7 @@
                   <a:solidFill>
                     <a:srgbClr val="243C9B"/>
                   </a:solidFill>
-                  <a:latin typeface="Serpentine-Bold-Bold" pitchFamily="2" charset="0"/>
+                  <a:latin typeface="Serpentine-Bold" panose="02000500000000000000" pitchFamily="2" charset="0"/>
                 </a:rPr>
                 <a:t>High Performance ParalleX</a:t>
               </a:r>
@@ -3731,7 +3731,7 @@
                 <a:solidFill>
                   <a:srgbClr val="243C9B"/>
                 </a:solidFill>
-                <a:latin typeface="Serpentine-Bold-Bold" pitchFamily="2" charset="0"/>
+                <a:latin typeface="Serpentine-Bold" panose="02000500000000000000" pitchFamily="2" charset="0"/>
               </a:endParaRPr>
             </a:p>
           </p:txBody>
@@ -3822,7 +3822,7 @@
                   <a:solidFill>
                     <a:srgbClr val="243C9B"/>
                   </a:solidFill>
-                  <a:latin typeface="Serpentine-Bold-Bold" pitchFamily="2" charset="0"/>
+                  <a:latin typeface="Serpentine-Bold" panose="02000500000000000000" pitchFamily="2" charset="0"/>
                 </a:rPr>
                 <a:t>HPX V0.9.7</a:t>
               </a:r>
@@ -3833,7 +3833,7 @@
                   <a:solidFill>
                     <a:srgbClr val="243C9B"/>
                   </a:solidFill>
-                  <a:latin typeface="Serpentine-Bold-Bold" pitchFamily="2" charset="0"/>
+                  <a:latin typeface="Serpentine-Bold" panose="02000500000000000000" pitchFamily="2" charset="0"/>
                 </a:rPr>
                 <a:t>High Performance ParalleX</a:t>
               </a:r>
@@ -3841,7 +3841,7 @@
                 <a:solidFill>
                   <a:srgbClr val="243C9B"/>
                 </a:solidFill>
-                <a:latin typeface="Serpentine-Bold-Bold" pitchFamily="2" charset="0"/>
+                <a:latin typeface="Serpentine-Bold" panose="02000500000000000000" pitchFamily="2" charset="0"/>
               </a:endParaRPr>
             </a:p>
           </p:txBody>
@@ -3918,25 +3918,10 @@
                 <a:solidFill>
                   <a:srgbClr val="243C9B"/>
                 </a:solidFill>
-                <a:latin typeface="Serpentine-Bold-Bold" pitchFamily="2" charset="0"/>
+                <a:latin typeface="Serpentine-Bold" panose="02000500000000000000" pitchFamily="2" charset="0"/>
               </a:rPr>
-              <a:t>HPX </a:t>
-            </a:r>
-            <a:r>
-              <a:rPr lang="en-US" sz="4800" i="1" dirty="0" smtClean="0">
-                <a:solidFill>
-                  <a:srgbClr val="243C9B"/>
-                </a:solidFill>
-                <a:latin typeface="Serpentine-Bold-Bold" pitchFamily="2" charset="0"/>
-              </a:rPr>
-              <a:t>V0.9.8</a:t>
-            </a:r>
-            <a:endParaRPr lang="en-US" sz="4800" i="1" dirty="0" smtClean="0">
-              <a:solidFill>
-                <a:srgbClr val="243C9B"/>
-              </a:solidFill>
-              <a:latin typeface="Serpentine-Bold-Bold" pitchFamily="2" charset="0"/>
-            </a:endParaRPr>
+              <a:t>HPX V0.9.8</a:t>
+            </a:r>
           </a:p>
           <a:p>
             <a:r>
@@ -3944,7 +3929,7 @@
                 <a:solidFill>
                   <a:srgbClr val="243C9B"/>
                 </a:solidFill>
-                <a:latin typeface="Serpentine-Bold-Bold" pitchFamily="2" charset="0"/>
+                <a:latin typeface="Serpentine-Bold" panose="02000500000000000000" pitchFamily="2" charset="0"/>
               </a:rPr>
               <a:t>High Performance ParalleX</a:t>
             </a:r>
@@ -3952,7 +3937,7 @@
               <a:solidFill>
                 <a:srgbClr val="243C9B"/>
               </a:solidFill>
-              <a:latin typeface="Serpentine-Bold-Bold" pitchFamily="2" charset="0"/>
+              <a:latin typeface="Serpentine-Bold" panose="02000500000000000000" pitchFamily="2" charset="0"/>
             </a:endParaRPr>
           </a:p>
         </p:txBody>
@@ -3967,6 +3952,241 @@
   <p:clrMapOvr>
     <a:masterClrMapping/>
   </p:clrMapOvr>
+  <p:timing>
+    <p:tnLst>
+      <p:par>
+        <p:cTn id="1" dur="indefinite" restart="never" nodeType="tmRoot"/>
+      </p:par>
+    </p:tnLst>
+  </p:timing>
+</p:sld>
+</file>
+
+<file path=ppt/slides/slide4.xml><?xml version="1.0" encoding="utf-8"?>
+<p:sld xmlns:a="http://schemas.openxmlformats.org/drawingml/2006/main" xmlns:r="http://schemas.openxmlformats.org/officeDocument/2006/relationships" xmlns:p="http://schemas.openxmlformats.org/presentationml/2006/main">
+  <p:cSld>
+    <p:spTree>
+      <p:nvGrpSpPr>
+        <p:cNvPr id="1" name=""/>
+        <p:cNvGrpSpPr/>
+        <p:nvPr/>
+      </p:nvGrpSpPr>
+      <p:grpSpPr>
+        <a:xfrm>
+          <a:off x="0" y="0"/>
+          <a:ext cx="0" cy="0"/>
+          <a:chOff x="0" y="0"/>
+          <a:chExt cx="0" cy="0"/>
+        </a:xfrm>
+      </p:grpSpPr>
+      <p:grpSp>
+        <p:nvGrpSpPr>
+          <p:cNvPr id="4" name="Group 3"/>
+          <p:cNvGrpSpPr/>
+          <p:nvPr/>
+        </p:nvGrpSpPr>
+        <p:grpSpPr>
+          <a:xfrm>
+            <a:off x="1905000" y="4267200"/>
+            <a:ext cx="4472152" cy="954107"/>
+            <a:chOff x="1828800" y="2859613"/>
+            <a:chExt cx="4472152" cy="954107"/>
+          </a:xfrm>
+        </p:grpSpPr>
+        <p:sp>
+          <p:nvSpPr>
+            <p:cNvPr id="2" name="TextBox 1"/>
+            <p:cNvSpPr txBox="1"/>
+            <p:nvPr/>
+          </p:nvSpPr>
+          <p:spPr>
+            <a:xfrm>
+              <a:off x="1828800" y="2859613"/>
+              <a:ext cx="4187365" cy="954107"/>
+            </a:xfrm>
+            <a:prstGeom prst="rect">
+              <a:avLst/>
+            </a:prstGeom>
+            <a:noFill/>
+          </p:spPr>
+          <p:txBody>
+            <a:bodyPr wrap="none" rtlCol="0">
+              <a:spAutoFit/>
+            </a:bodyPr>
+            <a:lstStyle/>
+            <a:p>
+              <a:r>
+                <a:rPr lang="en-US" sz="3400" i="1" dirty="0" smtClean="0">
+                  <a:solidFill>
+                    <a:srgbClr val="243C9B"/>
+                  </a:solidFill>
+                  <a:latin typeface="Serpentine-Bold" panose="02000500000000000000" pitchFamily="2" charset="0"/>
+                </a:rPr>
+                <a:t>HPX </a:t>
+              </a:r>
+              <a:r>
+                <a:rPr lang="en-US" sz="3400" i="1" dirty="0" smtClean="0">
+                  <a:solidFill>
+                    <a:srgbClr val="243C9B"/>
+                  </a:solidFill>
+                  <a:latin typeface="Serpentine-Bold" panose="02000500000000000000" pitchFamily="2" charset="0"/>
+                </a:rPr>
+                <a:t>V0.9.10</a:t>
+              </a:r>
+              <a:endParaRPr lang="en-US" sz="3400" i="1" dirty="0" smtClean="0">
+                <a:solidFill>
+                  <a:srgbClr val="243C9B"/>
+                </a:solidFill>
+                <a:latin typeface="Serpentine-Bold" panose="02000500000000000000" pitchFamily="2" charset="0"/>
+              </a:endParaRPr>
+            </a:p>
+            <a:p>
+              <a:r>
+                <a:rPr lang="en-US" sz="2000" i="1" dirty="0" smtClean="0">
+                  <a:solidFill>
+                    <a:srgbClr val="243C9B"/>
+                  </a:solidFill>
+                  <a:latin typeface="Serpentine-Bold" panose="02000500000000000000" pitchFamily="2" charset="0"/>
+                </a:rPr>
+                <a:t>High Performance ParalleX</a:t>
+              </a:r>
+              <a:endParaRPr lang="en-US" sz="2000" i="1" dirty="0">
+                <a:solidFill>
+                  <a:srgbClr val="243C9B"/>
+                </a:solidFill>
+                <a:latin typeface="Serpentine-Bold" panose="02000500000000000000" pitchFamily="2" charset="0"/>
+              </a:endParaRPr>
+            </a:p>
+          </p:txBody>
+        </p:sp>
+        <p:sp>
+          <p:nvSpPr>
+            <p:cNvPr id="3" name="TextBox 2"/>
+            <p:cNvSpPr txBox="1"/>
+            <p:nvPr/>
+          </p:nvSpPr>
+          <p:spPr>
+            <a:xfrm>
+              <a:off x="4929352" y="3035661"/>
+              <a:ext cx="1371600" cy="400110"/>
+            </a:xfrm>
+            <a:prstGeom prst="rect">
+              <a:avLst/>
+            </a:prstGeom>
+            <a:noFill/>
+          </p:spPr>
+          <p:txBody>
+            <a:bodyPr wrap="square" rtlCol="0">
+              <a:spAutoFit/>
+            </a:bodyPr>
+            <a:lstStyle/>
+            <a:p>
+              <a:r>
+                <a:rPr lang="en-US" sz="2000" dirty="0" smtClean="0">
+                  <a:solidFill>
+                    <a:srgbClr val="C00000">
+                      <a:alpha val="90000"/>
+                    </a:srgbClr>
+                  </a:solidFill>
+                  <a:latin typeface="Arial Black" panose="020B0A04020102020204" pitchFamily="34" charset="0"/>
+                </a:rPr>
+                <a:t>DRAFT</a:t>
+              </a:r>
+              <a:endParaRPr lang="en-US" sz="2000" dirty="0">
+                <a:solidFill>
+                  <a:srgbClr val="C00000">
+                    <a:alpha val="90000"/>
+                  </a:srgbClr>
+                </a:solidFill>
+                <a:latin typeface="Arial Black" panose="020B0A04020102020204" pitchFamily="34" charset="0"/>
+              </a:endParaRPr>
+            </a:p>
+          </p:txBody>
+        </p:sp>
+      </p:grpSp>
+      <p:sp>
+        <p:nvSpPr>
+          <p:cNvPr id="8" name="TextBox 7"/>
+          <p:cNvSpPr txBox="1"/>
+          <p:nvPr/>
+        </p:nvSpPr>
+        <p:spPr>
+          <a:xfrm>
+            <a:off x="1828800" y="2727277"/>
+            <a:ext cx="4187365" cy="1138773"/>
+          </a:xfrm>
+          <a:prstGeom prst="rect">
+            <a:avLst/>
+          </a:prstGeom>
+          <a:noFill/>
+        </p:spPr>
+        <p:txBody>
+          <a:bodyPr wrap="none" rtlCol="0">
+            <a:spAutoFit/>
+          </a:bodyPr>
+          <a:lstStyle/>
+          <a:p>
+            <a:r>
+              <a:rPr lang="en-US" sz="4800" i="1" dirty="0" smtClean="0">
+                <a:solidFill>
+                  <a:srgbClr val="243C9B"/>
+                </a:solidFill>
+                <a:latin typeface="Serpentine-Bold" panose="02000500000000000000" pitchFamily="2" charset="0"/>
+              </a:rPr>
+              <a:t>HPX </a:t>
+            </a:r>
+            <a:r>
+              <a:rPr lang="en-US" sz="4800" i="1" dirty="0" smtClean="0">
+                <a:solidFill>
+                  <a:srgbClr val="243C9B"/>
+                </a:solidFill>
+                <a:latin typeface="Serpentine-Bold" panose="02000500000000000000" pitchFamily="2" charset="0"/>
+              </a:rPr>
+              <a:t>V0.9.9</a:t>
+            </a:r>
+            <a:endParaRPr lang="en-US" sz="4800" i="1" dirty="0" smtClean="0">
+              <a:solidFill>
+                <a:srgbClr val="243C9B"/>
+              </a:solidFill>
+              <a:latin typeface="Serpentine-Bold" panose="02000500000000000000" pitchFamily="2" charset="0"/>
+            </a:endParaRPr>
+          </a:p>
+          <a:p>
+            <a:r>
+              <a:rPr lang="en-US" sz="2000" i="1" dirty="0" smtClean="0">
+                <a:solidFill>
+                  <a:srgbClr val="243C9B"/>
+                </a:solidFill>
+                <a:latin typeface="Serpentine-Bold" panose="02000500000000000000" pitchFamily="2" charset="0"/>
+              </a:rPr>
+              <a:t>High Performance ParalleX</a:t>
+            </a:r>
+            <a:endParaRPr lang="en-US" sz="2000" i="1" dirty="0">
+              <a:solidFill>
+                <a:srgbClr val="243C9B"/>
+              </a:solidFill>
+              <a:latin typeface="Serpentine-Bold" panose="02000500000000000000" pitchFamily="2" charset="0"/>
+            </a:endParaRPr>
+          </a:p>
+        </p:txBody>
+      </p:sp>
+    </p:spTree>
+    <p:extLst>
+      <p:ext uri="{BB962C8B-B14F-4D97-AF65-F5344CB8AC3E}">
+        <p14:creationId xmlns:p14="http://schemas.microsoft.com/office/powerpoint/2010/main" val="2311007423"/>
+      </p:ext>
+    </p:extLst>
+  </p:cSld>
+  <p:clrMapOvr>
+    <a:masterClrMapping/>
+  </p:clrMapOvr>
+  <p:timing>
+    <p:tnLst>
+      <p:par>
+        <p:cTn id="1" dur="indefinite" restart="never" nodeType="tmRoot"/>
+      </p:par>
+    </p:tnLst>
+  </p:timing>
 </p:sld>
 </file>
 

</xml_diff>

<commit_message>
Adding new version images
</commit_message>
<xml_diff>
--- a/docs/version.pptx
+++ b/docs/version.pptx
@@ -9,6 +9,7 @@
     <p:sldId id="257" r:id="rId3"/>
     <p:sldId id="258" r:id="rId4"/>
     <p:sldId id="259" r:id="rId5"/>
+    <p:sldId id="260" r:id="rId6"/>
   </p:sldIdLst>
   <p:sldSz cx="9144000" cy="6858000" type="screen4x3"/>
   <p:notesSz cx="6858000" cy="9144000"/>
@@ -307,7 +308,7 @@
           <a:p>
             <a:fld id="{78D91B59-3308-4288-9FFB-76344938B6F4}" type="datetimeFigureOut">
               <a:rPr lang="en-US" smtClean="0"/>
-              <a:t>9/14/2014</a:t>
+              <a:t>3/2/2015</a:t>
             </a:fld>
             <a:endParaRPr lang="en-US"/>
           </a:p>
@@ -477,7 +478,7 @@
           <a:p>
             <a:fld id="{78D91B59-3308-4288-9FFB-76344938B6F4}" type="datetimeFigureOut">
               <a:rPr lang="en-US" smtClean="0"/>
-              <a:t>9/14/2014</a:t>
+              <a:t>3/2/2015</a:t>
             </a:fld>
             <a:endParaRPr lang="en-US"/>
           </a:p>
@@ -657,7 +658,7 @@
           <a:p>
             <a:fld id="{78D91B59-3308-4288-9FFB-76344938B6F4}" type="datetimeFigureOut">
               <a:rPr lang="en-US" smtClean="0"/>
-              <a:t>9/14/2014</a:t>
+              <a:t>3/2/2015</a:t>
             </a:fld>
             <a:endParaRPr lang="en-US"/>
           </a:p>
@@ -827,7 +828,7 @@
           <a:p>
             <a:fld id="{78D91B59-3308-4288-9FFB-76344938B6F4}" type="datetimeFigureOut">
               <a:rPr lang="en-US" smtClean="0"/>
-              <a:t>9/14/2014</a:t>
+              <a:t>3/2/2015</a:t>
             </a:fld>
             <a:endParaRPr lang="en-US"/>
           </a:p>
@@ -1073,7 +1074,7 @@
           <a:p>
             <a:fld id="{78D91B59-3308-4288-9FFB-76344938B6F4}" type="datetimeFigureOut">
               <a:rPr lang="en-US" smtClean="0"/>
-              <a:t>9/14/2014</a:t>
+              <a:t>3/2/2015</a:t>
             </a:fld>
             <a:endParaRPr lang="en-US"/>
           </a:p>
@@ -1361,7 +1362,7 @@
           <a:p>
             <a:fld id="{78D91B59-3308-4288-9FFB-76344938B6F4}" type="datetimeFigureOut">
               <a:rPr lang="en-US" smtClean="0"/>
-              <a:t>9/14/2014</a:t>
+              <a:t>3/2/2015</a:t>
             </a:fld>
             <a:endParaRPr lang="en-US"/>
           </a:p>
@@ -1783,7 +1784,7 @@
           <a:p>
             <a:fld id="{78D91B59-3308-4288-9FFB-76344938B6F4}" type="datetimeFigureOut">
               <a:rPr lang="en-US" smtClean="0"/>
-              <a:t>9/14/2014</a:t>
+              <a:t>3/2/2015</a:t>
             </a:fld>
             <a:endParaRPr lang="en-US"/>
           </a:p>
@@ -1901,7 +1902,7 @@
           <a:p>
             <a:fld id="{78D91B59-3308-4288-9FFB-76344938B6F4}" type="datetimeFigureOut">
               <a:rPr lang="en-US" smtClean="0"/>
-              <a:t>9/14/2014</a:t>
+              <a:t>3/2/2015</a:t>
             </a:fld>
             <a:endParaRPr lang="en-US"/>
           </a:p>
@@ -1996,7 +1997,7 @@
           <a:p>
             <a:fld id="{78D91B59-3308-4288-9FFB-76344938B6F4}" type="datetimeFigureOut">
               <a:rPr lang="en-US" smtClean="0"/>
-              <a:t>9/14/2014</a:t>
+              <a:t>3/2/2015</a:t>
             </a:fld>
             <a:endParaRPr lang="en-US"/>
           </a:p>
@@ -2273,7 +2274,7 @@
           <a:p>
             <a:fld id="{78D91B59-3308-4288-9FFB-76344938B6F4}" type="datetimeFigureOut">
               <a:rPr lang="en-US" smtClean="0"/>
-              <a:t>9/14/2014</a:t>
+              <a:t>3/2/2015</a:t>
             </a:fld>
             <a:endParaRPr lang="en-US"/>
           </a:p>
@@ -2526,7 +2527,7 @@
           <a:p>
             <a:fld id="{78D91B59-3308-4288-9FFB-76344938B6F4}" type="datetimeFigureOut">
               <a:rPr lang="en-US" smtClean="0"/>
-              <a:t>9/14/2014</a:t>
+              <a:t>3/2/2015</a:t>
             </a:fld>
             <a:endParaRPr lang="en-US"/>
           </a:p>
@@ -2739,7 +2740,7 @@
           <a:p>
             <a:fld id="{78D91B59-3308-4288-9FFB-76344938B6F4}" type="datetimeFigureOut">
               <a:rPr lang="en-US" smtClean="0"/>
-              <a:t>9/14/2014</a:t>
+              <a:t>3/2/2015</a:t>
             </a:fld>
             <a:endParaRPr lang="en-US"/>
           </a:p>
@@ -4022,23 +4023,8 @@
                   </a:solidFill>
                   <a:latin typeface="Serpentine-Bold" panose="02000500000000000000" pitchFamily="2" charset="0"/>
                 </a:rPr>
-                <a:t>HPX </a:t>
+                <a:t>HPX V0.9.10</a:t>
               </a:r>
-              <a:r>
-                <a:rPr lang="en-US" sz="3400" i="1" dirty="0" smtClean="0">
-                  <a:solidFill>
-                    <a:srgbClr val="243C9B"/>
-                  </a:solidFill>
-                  <a:latin typeface="Serpentine-Bold" panose="02000500000000000000" pitchFamily="2" charset="0"/>
-                </a:rPr>
-                <a:t>V0.9.10</a:t>
-              </a:r>
-              <a:endParaRPr lang="en-US" sz="3400" i="1" dirty="0" smtClean="0">
-                <a:solidFill>
-                  <a:srgbClr val="243C9B"/>
-                </a:solidFill>
-                <a:latin typeface="Serpentine-Bold" panose="02000500000000000000" pitchFamily="2" charset="0"/>
-              </a:endParaRPr>
             </a:p>
             <a:p>
               <a:r>
@@ -4133,23 +4119,8 @@
                 </a:solidFill>
                 <a:latin typeface="Serpentine-Bold" panose="02000500000000000000" pitchFamily="2" charset="0"/>
               </a:rPr>
-              <a:t>HPX </a:t>
-            </a:r>
-            <a:r>
-              <a:rPr lang="en-US" sz="4800" i="1" dirty="0" smtClean="0">
-                <a:solidFill>
-                  <a:srgbClr val="243C9B"/>
-                </a:solidFill>
-                <a:latin typeface="Serpentine-Bold" panose="02000500000000000000" pitchFamily="2" charset="0"/>
-              </a:rPr>
-              <a:t>V0.9.9</a:t>
-            </a:r>
-            <a:endParaRPr lang="en-US" sz="4800" i="1" dirty="0" smtClean="0">
-              <a:solidFill>
-                <a:srgbClr val="243C9B"/>
-              </a:solidFill>
-              <a:latin typeface="Serpentine-Bold" panose="02000500000000000000" pitchFamily="2" charset="0"/>
-            </a:endParaRPr>
+              <a:t>HPX V0.9.9</a:t>
+            </a:r>
           </a:p>
           <a:p>
             <a:r>
@@ -4174,6 +4145,234 @@
     <p:extLst>
       <p:ext uri="{BB962C8B-B14F-4D97-AF65-F5344CB8AC3E}">
         <p14:creationId xmlns:p14="http://schemas.microsoft.com/office/powerpoint/2010/main" val="2311007423"/>
+      </p:ext>
+    </p:extLst>
+  </p:cSld>
+  <p:clrMapOvr>
+    <a:masterClrMapping/>
+  </p:clrMapOvr>
+  <p:timing>
+    <p:tnLst>
+      <p:par>
+        <p:cTn id="1" dur="indefinite" restart="never" nodeType="tmRoot"/>
+      </p:par>
+    </p:tnLst>
+  </p:timing>
+</p:sld>
+</file>
+
+<file path=ppt/slides/slide5.xml><?xml version="1.0" encoding="utf-8"?>
+<p:sld xmlns:a="http://schemas.openxmlformats.org/drawingml/2006/main" xmlns:r="http://schemas.openxmlformats.org/officeDocument/2006/relationships" xmlns:p="http://schemas.openxmlformats.org/presentationml/2006/main">
+  <p:cSld>
+    <p:spTree>
+      <p:nvGrpSpPr>
+        <p:cNvPr id="1" name=""/>
+        <p:cNvGrpSpPr/>
+        <p:nvPr/>
+      </p:nvGrpSpPr>
+      <p:grpSpPr>
+        <a:xfrm>
+          <a:off x="0" y="0"/>
+          <a:ext cx="0" cy="0"/>
+          <a:chOff x="0" y="0"/>
+          <a:chExt cx="0" cy="0"/>
+        </a:xfrm>
+      </p:grpSpPr>
+      <p:grpSp>
+        <p:nvGrpSpPr>
+          <p:cNvPr id="4" name="Group 3"/>
+          <p:cNvGrpSpPr/>
+          <p:nvPr/>
+        </p:nvGrpSpPr>
+        <p:grpSpPr>
+          <a:xfrm>
+            <a:off x="1905000" y="4267200"/>
+            <a:ext cx="4419600" cy="954107"/>
+            <a:chOff x="1828800" y="2859613"/>
+            <a:chExt cx="4419600" cy="954107"/>
+          </a:xfrm>
+        </p:grpSpPr>
+        <p:sp>
+          <p:nvSpPr>
+            <p:cNvPr id="2" name="TextBox 1"/>
+            <p:cNvSpPr txBox="1"/>
+            <p:nvPr/>
+          </p:nvSpPr>
+          <p:spPr>
+            <a:xfrm>
+              <a:off x="1828800" y="2859613"/>
+              <a:ext cx="4187365" cy="954107"/>
+            </a:xfrm>
+            <a:prstGeom prst="rect">
+              <a:avLst/>
+            </a:prstGeom>
+            <a:noFill/>
+          </p:spPr>
+          <p:txBody>
+            <a:bodyPr wrap="none" rtlCol="0">
+              <a:spAutoFit/>
+            </a:bodyPr>
+            <a:lstStyle/>
+            <a:p>
+              <a:r>
+                <a:rPr lang="en-US" sz="3400" i="1" dirty="0" smtClean="0">
+                  <a:solidFill>
+                    <a:srgbClr val="243C9B"/>
+                  </a:solidFill>
+                  <a:latin typeface="Serpentine-Bold" panose="02000500000000000000" pitchFamily="2" charset="0"/>
+                </a:rPr>
+                <a:t>HPX </a:t>
+              </a:r>
+              <a:r>
+                <a:rPr lang="en-US" sz="3400" i="1" dirty="0" smtClean="0">
+                  <a:solidFill>
+                    <a:srgbClr val="243C9B"/>
+                  </a:solidFill>
+                  <a:latin typeface="Serpentine-Bold" panose="02000500000000000000" pitchFamily="2" charset="0"/>
+                </a:rPr>
+                <a:t>V0.9.11</a:t>
+              </a:r>
+              <a:endParaRPr lang="en-US" sz="3400" i="1" dirty="0" smtClean="0">
+                <a:solidFill>
+                  <a:srgbClr val="243C9B"/>
+                </a:solidFill>
+                <a:latin typeface="Serpentine-Bold" panose="02000500000000000000" pitchFamily="2" charset="0"/>
+              </a:endParaRPr>
+            </a:p>
+            <a:p>
+              <a:r>
+                <a:rPr lang="en-US" sz="2000" i="1" dirty="0" smtClean="0">
+                  <a:solidFill>
+                    <a:srgbClr val="243C9B"/>
+                  </a:solidFill>
+                  <a:latin typeface="Serpentine-Bold" panose="02000500000000000000" pitchFamily="2" charset="0"/>
+                </a:rPr>
+                <a:t>High Performance ParalleX</a:t>
+              </a:r>
+              <a:endParaRPr lang="en-US" sz="2000" i="1" dirty="0">
+                <a:solidFill>
+                  <a:srgbClr val="243C9B"/>
+                </a:solidFill>
+                <a:latin typeface="Serpentine-Bold" panose="02000500000000000000" pitchFamily="2" charset="0"/>
+              </a:endParaRPr>
+            </a:p>
+          </p:txBody>
+        </p:sp>
+        <p:sp>
+          <p:nvSpPr>
+            <p:cNvPr id="3" name="TextBox 2"/>
+            <p:cNvSpPr txBox="1"/>
+            <p:nvPr/>
+          </p:nvSpPr>
+          <p:spPr>
+            <a:xfrm>
+              <a:off x="4876800" y="3035661"/>
+              <a:ext cx="1371600" cy="400110"/>
+            </a:xfrm>
+            <a:prstGeom prst="rect">
+              <a:avLst/>
+            </a:prstGeom>
+            <a:noFill/>
+          </p:spPr>
+          <p:txBody>
+            <a:bodyPr wrap="square" rtlCol="0">
+              <a:spAutoFit/>
+            </a:bodyPr>
+            <a:lstStyle/>
+            <a:p>
+              <a:r>
+                <a:rPr lang="en-US" sz="2000" dirty="0" smtClean="0">
+                  <a:solidFill>
+                    <a:srgbClr val="C00000">
+                      <a:alpha val="90000"/>
+                    </a:srgbClr>
+                  </a:solidFill>
+                  <a:latin typeface="Arial Black" panose="020B0A04020102020204" pitchFamily="34" charset="0"/>
+                </a:rPr>
+                <a:t>DRAFT</a:t>
+              </a:r>
+              <a:endParaRPr lang="en-US" sz="2000" dirty="0">
+                <a:solidFill>
+                  <a:srgbClr val="C00000">
+                    <a:alpha val="90000"/>
+                  </a:srgbClr>
+                </a:solidFill>
+                <a:latin typeface="Arial Black" panose="020B0A04020102020204" pitchFamily="34" charset="0"/>
+              </a:endParaRPr>
+            </a:p>
+          </p:txBody>
+        </p:sp>
+      </p:grpSp>
+      <p:sp>
+        <p:nvSpPr>
+          <p:cNvPr id="8" name="TextBox 7"/>
+          <p:cNvSpPr txBox="1"/>
+          <p:nvPr/>
+        </p:nvSpPr>
+        <p:spPr>
+          <a:xfrm>
+            <a:off x="1828800" y="2727277"/>
+            <a:ext cx="4373313" cy="1123384"/>
+          </a:xfrm>
+          <a:prstGeom prst="rect">
+            <a:avLst/>
+          </a:prstGeom>
+          <a:noFill/>
+        </p:spPr>
+        <p:txBody>
+          <a:bodyPr wrap="none" rtlCol="0">
+            <a:spAutoFit/>
+          </a:bodyPr>
+          <a:lstStyle/>
+          <a:p>
+            <a:r>
+              <a:rPr lang="en-US" sz="4600" i="1" dirty="0" smtClean="0">
+                <a:solidFill>
+                  <a:srgbClr val="243C9B"/>
+                </a:solidFill>
+                <a:latin typeface="Serpentine-Bold" panose="02000500000000000000" pitchFamily="2" charset="0"/>
+              </a:rPr>
+              <a:t>HPX </a:t>
+            </a:r>
+            <a:r>
+              <a:rPr lang="en-US" sz="4600" i="1" dirty="0" smtClean="0">
+                <a:solidFill>
+                  <a:srgbClr val="243C9B"/>
+                </a:solidFill>
+                <a:latin typeface="Serpentine-Bold" panose="02000500000000000000" pitchFamily="2" charset="0"/>
+              </a:rPr>
+              <a:t>V0.9.10</a:t>
+            </a:r>
+            <a:endParaRPr lang="en-US" sz="4600" i="1" dirty="0" smtClean="0">
+              <a:solidFill>
+                <a:srgbClr val="243C9B"/>
+              </a:solidFill>
+              <a:latin typeface="Serpentine-Bold" panose="02000500000000000000" pitchFamily="2" charset="0"/>
+            </a:endParaRPr>
+          </a:p>
+          <a:p>
+            <a:r>
+              <a:rPr lang="en-US" sz="2100" i="1" dirty="0" smtClean="0">
+                <a:solidFill>
+                  <a:srgbClr val="243C9B"/>
+                </a:solidFill>
+                <a:latin typeface="Serpentine-Bold" panose="02000500000000000000" pitchFamily="2" charset="0"/>
+              </a:rPr>
+              <a:t>High Performance ParalleX</a:t>
+            </a:r>
+            <a:endParaRPr lang="en-US" sz="2100" i="1" dirty="0">
+              <a:solidFill>
+                <a:srgbClr val="243C9B"/>
+              </a:solidFill>
+              <a:latin typeface="Serpentine-Bold" panose="02000500000000000000" pitchFamily="2" charset="0"/>
+            </a:endParaRPr>
+          </a:p>
+        </p:txBody>
+      </p:sp>
+    </p:spTree>
+    <p:extLst>
+      <p:ext uri="{BB962C8B-B14F-4D97-AF65-F5344CB8AC3E}">
+        <p14:creationId xmlns:p14="http://schemas.microsoft.com/office/powerpoint/2010/main" val="1031938368"/>
       </p:ext>
     </p:extLst>
   </p:cSld>

</xml_diff>

<commit_message>
Adding images for new versions of docs
</commit_message>
<xml_diff>
--- a/docs/version.pptx
+++ b/docs/version.pptx
@@ -10,6 +10,7 @@
     <p:sldId id="258" r:id="rId4"/>
     <p:sldId id="259" r:id="rId5"/>
     <p:sldId id="260" r:id="rId6"/>
+    <p:sldId id="261" r:id="rId7"/>
   </p:sldIdLst>
   <p:sldSz cx="9144000" cy="6858000" type="screen4x3"/>
   <p:notesSz cx="6858000" cy="9144000"/>
@@ -308,7 +309,7 @@
           <a:p>
             <a:fld id="{78D91B59-3308-4288-9FFB-76344938B6F4}" type="datetimeFigureOut">
               <a:rPr lang="en-US" smtClean="0"/>
-              <a:t>3/2/2015</a:t>
+              <a:t>10/27/2015</a:t>
             </a:fld>
             <a:endParaRPr lang="en-US"/>
           </a:p>
@@ -478,7 +479,7 @@
           <a:p>
             <a:fld id="{78D91B59-3308-4288-9FFB-76344938B6F4}" type="datetimeFigureOut">
               <a:rPr lang="en-US" smtClean="0"/>
-              <a:t>3/2/2015</a:t>
+              <a:t>10/27/2015</a:t>
             </a:fld>
             <a:endParaRPr lang="en-US"/>
           </a:p>
@@ -658,7 +659,7 @@
           <a:p>
             <a:fld id="{78D91B59-3308-4288-9FFB-76344938B6F4}" type="datetimeFigureOut">
               <a:rPr lang="en-US" smtClean="0"/>
-              <a:t>3/2/2015</a:t>
+              <a:t>10/27/2015</a:t>
             </a:fld>
             <a:endParaRPr lang="en-US"/>
           </a:p>
@@ -828,7 +829,7 @@
           <a:p>
             <a:fld id="{78D91B59-3308-4288-9FFB-76344938B6F4}" type="datetimeFigureOut">
               <a:rPr lang="en-US" smtClean="0"/>
-              <a:t>3/2/2015</a:t>
+              <a:t>10/27/2015</a:t>
             </a:fld>
             <a:endParaRPr lang="en-US"/>
           </a:p>
@@ -1074,7 +1075,7 @@
           <a:p>
             <a:fld id="{78D91B59-3308-4288-9FFB-76344938B6F4}" type="datetimeFigureOut">
               <a:rPr lang="en-US" smtClean="0"/>
-              <a:t>3/2/2015</a:t>
+              <a:t>10/27/2015</a:t>
             </a:fld>
             <a:endParaRPr lang="en-US"/>
           </a:p>
@@ -1362,7 +1363,7 @@
           <a:p>
             <a:fld id="{78D91B59-3308-4288-9FFB-76344938B6F4}" type="datetimeFigureOut">
               <a:rPr lang="en-US" smtClean="0"/>
-              <a:t>3/2/2015</a:t>
+              <a:t>10/27/2015</a:t>
             </a:fld>
             <a:endParaRPr lang="en-US"/>
           </a:p>
@@ -1784,7 +1785,7 @@
           <a:p>
             <a:fld id="{78D91B59-3308-4288-9FFB-76344938B6F4}" type="datetimeFigureOut">
               <a:rPr lang="en-US" smtClean="0"/>
-              <a:t>3/2/2015</a:t>
+              <a:t>10/27/2015</a:t>
             </a:fld>
             <a:endParaRPr lang="en-US"/>
           </a:p>
@@ -1902,7 +1903,7 @@
           <a:p>
             <a:fld id="{78D91B59-3308-4288-9FFB-76344938B6F4}" type="datetimeFigureOut">
               <a:rPr lang="en-US" smtClean="0"/>
-              <a:t>3/2/2015</a:t>
+              <a:t>10/27/2015</a:t>
             </a:fld>
             <a:endParaRPr lang="en-US"/>
           </a:p>
@@ -1997,7 +1998,7 @@
           <a:p>
             <a:fld id="{78D91B59-3308-4288-9FFB-76344938B6F4}" type="datetimeFigureOut">
               <a:rPr lang="en-US" smtClean="0"/>
-              <a:t>3/2/2015</a:t>
+              <a:t>10/27/2015</a:t>
             </a:fld>
             <a:endParaRPr lang="en-US"/>
           </a:p>
@@ -2274,7 +2275,7 @@
           <a:p>
             <a:fld id="{78D91B59-3308-4288-9FFB-76344938B6F4}" type="datetimeFigureOut">
               <a:rPr lang="en-US" smtClean="0"/>
-              <a:t>3/2/2015</a:t>
+              <a:t>10/27/2015</a:t>
             </a:fld>
             <a:endParaRPr lang="en-US"/>
           </a:p>
@@ -2527,7 +2528,7 @@
           <a:p>
             <a:fld id="{78D91B59-3308-4288-9FFB-76344938B6F4}" type="datetimeFigureOut">
               <a:rPr lang="en-US" smtClean="0"/>
-              <a:t>3/2/2015</a:t>
+              <a:t>10/27/2015</a:t>
             </a:fld>
             <a:endParaRPr lang="en-US"/>
           </a:p>
@@ -2740,7 +2741,7 @@
           <a:p>
             <a:fld id="{78D91B59-3308-4288-9FFB-76344938B6F4}" type="datetimeFigureOut">
               <a:rPr lang="en-US" smtClean="0"/>
-              <a:t>3/2/2015</a:t>
+              <a:t>10/27/2015</a:t>
             </a:fld>
             <a:endParaRPr lang="en-US"/>
           </a:p>
@@ -4221,23 +4222,8 @@
                   </a:solidFill>
                   <a:latin typeface="Serpentine-Bold" panose="02000500000000000000" pitchFamily="2" charset="0"/>
                 </a:rPr>
-                <a:t>HPX </a:t>
+                <a:t>HPX V0.9.11</a:t>
               </a:r>
-              <a:r>
-                <a:rPr lang="en-US" sz="3400" i="1" dirty="0" smtClean="0">
-                  <a:solidFill>
-                    <a:srgbClr val="243C9B"/>
-                  </a:solidFill>
-                  <a:latin typeface="Serpentine-Bold" panose="02000500000000000000" pitchFamily="2" charset="0"/>
-                </a:rPr>
-                <a:t>V0.9.11</a:t>
-              </a:r>
-              <a:endParaRPr lang="en-US" sz="3400" i="1" dirty="0" smtClean="0">
-                <a:solidFill>
-                  <a:srgbClr val="243C9B"/>
-                </a:solidFill>
-                <a:latin typeface="Serpentine-Bold" panose="02000500000000000000" pitchFamily="2" charset="0"/>
-              </a:endParaRPr>
             </a:p>
             <a:p>
               <a:r>
@@ -4332,16 +4318,229 @@
                 </a:solidFill>
                 <a:latin typeface="Serpentine-Bold" panose="02000500000000000000" pitchFamily="2" charset="0"/>
               </a:rPr>
-              <a:t>HPX </a:t>
-            </a:r>
-            <a:r>
-              <a:rPr lang="en-US" sz="4600" i="1" dirty="0" smtClean="0">
+              <a:t>HPX V0.9.10</a:t>
+            </a:r>
+          </a:p>
+          <a:p>
+            <a:r>
+              <a:rPr lang="en-US" sz="2100" i="1" dirty="0" smtClean="0">
                 <a:solidFill>
                   <a:srgbClr val="243C9B"/>
                 </a:solidFill>
                 <a:latin typeface="Serpentine-Bold" panose="02000500000000000000" pitchFamily="2" charset="0"/>
               </a:rPr>
-              <a:t>V0.9.10</a:t>
+              <a:t>High Performance ParalleX</a:t>
+            </a:r>
+            <a:endParaRPr lang="en-US" sz="2100" i="1" dirty="0">
+              <a:solidFill>
+                <a:srgbClr val="243C9B"/>
+              </a:solidFill>
+              <a:latin typeface="Serpentine-Bold" panose="02000500000000000000" pitchFamily="2" charset="0"/>
+            </a:endParaRPr>
+          </a:p>
+        </p:txBody>
+      </p:sp>
+    </p:spTree>
+    <p:extLst>
+      <p:ext uri="{BB962C8B-B14F-4D97-AF65-F5344CB8AC3E}">
+        <p14:creationId xmlns:p14="http://schemas.microsoft.com/office/powerpoint/2010/main" val="1031938368"/>
+      </p:ext>
+    </p:extLst>
+  </p:cSld>
+  <p:clrMapOvr>
+    <a:masterClrMapping/>
+  </p:clrMapOvr>
+  <p:timing>
+    <p:tnLst>
+      <p:par>
+        <p:cTn id="1" dur="indefinite" restart="never" nodeType="tmRoot"/>
+      </p:par>
+    </p:tnLst>
+  </p:timing>
+</p:sld>
+</file>
+
+<file path=ppt/slides/slide6.xml><?xml version="1.0" encoding="utf-8"?>
+<p:sld xmlns:a="http://schemas.openxmlformats.org/drawingml/2006/main" xmlns:r="http://schemas.openxmlformats.org/officeDocument/2006/relationships" xmlns:p="http://schemas.openxmlformats.org/presentationml/2006/main">
+  <p:cSld>
+    <p:spTree>
+      <p:nvGrpSpPr>
+        <p:cNvPr id="1" name=""/>
+        <p:cNvGrpSpPr/>
+        <p:nvPr/>
+      </p:nvGrpSpPr>
+      <p:grpSpPr>
+        <a:xfrm>
+          <a:off x="0" y="0"/>
+          <a:ext cx="0" cy="0"/>
+          <a:chOff x="0" y="0"/>
+          <a:chExt cx="0" cy="0"/>
+        </a:xfrm>
+      </p:grpSpPr>
+      <p:grpSp>
+        <p:nvGrpSpPr>
+          <p:cNvPr id="4" name="Group 3"/>
+          <p:cNvGrpSpPr/>
+          <p:nvPr/>
+        </p:nvGrpSpPr>
+        <p:grpSpPr>
+          <a:xfrm>
+            <a:off x="1905000" y="4267200"/>
+            <a:ext cx="4511566" cy="954107"/>
+            <a:chOff x="1828800" y="2859613"/>
+            <a:chExt cx="4511566" cy="954107"/>
+          </a:xfrm>
+        </p:grpSpPr>
+        <p:sp>
+          <p:nvSpPr>
+            <p:cNvPr id="2" name="TextBox 1"/>
+            <p:cNvSpPr txBox="1"/>
+            <p:nvPr/>
+          </p:nvSpPr>
+          <p:spPr>
+            <a:xfrm>
+              <a:off x="1828800" y="2859613"/>
+              <a:ext cx="4187365" cy="954107"/>
+            </a:xfrm>
+            <a:prstGeom prst="rect">
+              <a:avLst/>
+            </a:prstGeom>
+            <a:noFill/>
+          </p:spPr>
+          <p:txBody>
+            <a:bodyPr wrap="none" rtlCol="0">
+              <a:spAutoFit/>
+            </a:bodyPr>
+            <a:lstStyle/>
+            <a:p>
+              <a:r>
+                <a:rPr lang="en-US" sz="3400" i="1" dirty="0" smtClean="0">
+                  <a:solidFill>
+                    <a:srgbClr val="243C9B"/>
+                  </a:solidFill>
+                  <a:latin typeface="Serpentine-Bold" panose="02000500000000000000" pitchFamily="2" charset="0"/>
+                </a:rPr>
+                <a:t>HPX </a:t>
+              </a:r>
+              <a:r>
+                <a:rPr lang="en-US" sz="3400" i="1" dirty="0" smtClean="0">
+                  <a:solidFill>
+                    <a:srgbClr val="243C9B"/>
+                  </a:solidFill>
+                  <a:latin typeface="Serpentine-Bold" panose="02000500000000000000" pitchFamily="2" charset="0"/>
+                </a:rPr>
+                <a:t>V0.9.12</a:t>
+              </a:r>
+              <a:endParaRPr lang="en-US" sz="3400" i="1" dirty="0" smtClean="0">
+                <a:solidFill>
+                  <a:srgbClr val="243C9B"/>
+                </a:solidFill>
+                <a:latin typeface="Serpentine-Bold" panose="02000500000000000000" pitchFamily="2" charset="0"/>
+              </a:endParaRPr>
+            </a:p>
+            <a:p>
+              <a:r>
+                <a:rPr lang="en-US" sz="2000" i="1" dirty="0" smtClean="0">
+                  <a:solidFill>
+                    <a:srgbClr val="243C9B"/>
+                  </a:solidFill>
+                  <a:latin typeface="Serpentine-Bold" panose="02000500000000000000" pitchFamily="2" charset="0"/>
+                </a:rPr>
+                <a:t>High Performance ParalleX</a:t>
+              </a:r>
+              <a:endParaRPr lang="en-US" sz="2000" i="1" dirty="0">
+                <a:solidFill>
+                  <a:srgbClr val="243C9B"/>
+                </a:solidFill>
+                <a:latin typeface="Serpentine-Bold" panose="02000500000000000000" pitchFamily="2" charset="0"/>
+              </a:endParaRPr>
+            </a:p>
+          </p:txBody>
+        </p:sp>
+        <p:sp>
+          <p:nvSpPr>
+            <p:cNvPr id="3" name="TextBox 2"/>
+            <p:cNvSpPr txBox="1"/>
+            <p:nvPr/>
+          </p:nvSpPr>
+          <p:spPr>
+            <a:xfrm>
+              <a:off x="4968766" y="3068216"/>
+              <a:ext cx="1371600" cy="335757"/>
+            </a:xfrm>
+            <a:prstGeom prst="rect">
+              <a:avLst/>
+            </a:prstGeom>
+            <a:noFill/>
+          </p:spPr>
+          <p:txBody>
+            <a:bodyPr wrap="square" rtlCol="0">
+              <a:spAutoFit/>
+            </a:bodyPr>
+            <a:lstStyle/>
+            <a:p>
+              <a:r>
+                <a:rPr lang="en-US" dirty="0" smtClean="0">
+                  <a:solidFill>
+                    <a:srgbClr val="C00000">
+                      <a:alpha val="90000"/>
+                    </a:srgbClr>
+                  </a:solidFill>
+                  <a:latin typeface="Arial Black" panose="020B0A04020102020204" pitchFamily="34" charset="0"/>
+                </a:rPr>
+                <a:t>DRAFT</a:t>
+              </a:r>
+              <a:endParaRPr lang="en-US" dirty="0">
+                <a:solidFill>
+                  <a:srgbClr val="C00000">
+                    <a:alpha val="90000"/>
+                  </a:srgbClr>
+                </a:solidFill>
+                <a:latin typeface="Arial Black" panose="020B0A04020102020204" pitchFamily="34" charset="0"/>
+              </a:endParaRPr>
+            </a:p>
+          </p:txBody>
+        </p:sp>
+      </p:grpSp>
+      <p:sp>
+        <p:nvSpPr>
+          <p:cNvPr id="8" name="TextBox 7"/>
+          <p:cNvSpPr txBox="1"/>
+          <p:nvPr/>
+        </p:nvSpPr>
+        <p:spPr>
+          <a:xfrm>
+            <a:off x="1828800" y="2727277"/>
+            <a:ext cx="4373313" cy="1123384"/>
+          </a:xfrm>
+          <a:prstGeom prst="rect">
+            <a:avLst/>
+          </a:prstGeom>
+          <a:noFill/>
+        </p:spPr>
+        <p:txBody>
+          <a:bodyPr wrap="none" rtlCol="0">
+            <a:spAutoFit/>
+          </a:bodyPr>
+          <a:lstStyle/>
+          <a:p>
+            <a:r>
+              <a:rPr lang="en-US" sz="4600" i="1" dirty="0" smtClean="0">
+                <a:solidFill>
+                  <a:srgbClr val="243C9B"/>
+                </a:solidFill>
+                <a:latin typeface="Serpentine-Bold" panose="02000500000000000000" pitchFamily="2" charset="0"/>
+              </a:rPr>
+              <a:t>HPX </a:t>
+            </a:r>
+            <a:r>
+              <a:rPr lang="en-US" sz="4600" i="1" dirty="0" smtClean="0">
+                <a:solidFill>
+                  <a:srgbClr val="243C9B"/>
+                </a:solidFill>
+                <a:latin typeface="Serpentine-Bold" panose="02000500000000000000" pitchFamily="2" charset="0"/>
+              </a:rPr>
+              <a:t>V0.9.11</a:t>
             </a:r>
             <a:endParaRPr lang="en-US" sz="4600" i="1" dirty="0" smtClean="0">
               <a:solidFill>
@@ -4372,7 +4571,7 @@
     </p:spTree>
     <p:extLst>
       <p:ext uri="{BB962C8B-B14F-4D97-AF65-F5344CB8AC3E}">
-        <p14:creationId xmlns:p14="http://schemas.microsoft.com/office/powerpoint/2010/main" val="1031938368"/>
+        <p14:creationId xmlns:p14="http://schemas.microsoft.com/office/powerpoint/2010/main" val="1097584615"/>
       </p:ext>
     </p:extLst>
   </p:cSld>

</xml_diff>

<commit_message>
Preparing for release of V0.9.99
- adding more closed tickets to docs
- flyby: hiding debug symbol from doxygen
</commit_message>
<xml_diff>
--- a/docs/version.pptx
+++ b/docs/version.pptx
@@ -11,6 +11,7 @@
     <p:sldId id="259" r:id="rId5"/>
     <p:sldId id="260" r:id="rId6"/>
     <p:sldId id="261" r:id="rId7"/>
+    <p:sldId id="262" r:id="rId8"/>
   </p:sldIdLst>
   <p:sldSz cx="9144000" cy="6858000" type="screen4x3"/>
   <p:notesSz cx="6858000" cy="9144000"/>
@@ -309,7 +310,7 @@
           <a:p>
             <a:fld id="{78D91B59-3308-4288-9FFB-76344938B6F4}" type="datetimeFigureOut">
               <a:rPr lang="en-US" smtClean="0"/>
-              <a:t>11/4/2015</a:t>
+              <a:t>6/22/2016</a:t>
             </a:fld>
             <a:endParaRPr lang="en-US"/>
           </a:p>
@@ -479,7 +480,7 @@
           <a:p>
             <a:fld id="{78D91B59-3308-4288-9FFB-76344938B6F4}" type="datetimeFigureOut">
               <a:rPr lang="en-US" smtClean="0"/>
-              <a:t>11/4/2015</a:t>
+              <a:t>6/22/2016</a:t>
             </a:fld>
             <a:endParaRPr lang="en-US"/>
           </a:p>
@@ -659,7 +660,7 @@
           <a:p>
             <a:fld id="{78D91B59-3308-4288-9FFB-76344938B6F4}" type="datetimeFigureOut">
               <a:rPr lang="en-US" smtClean="0"/>
-              <a:t>11/4/2015</a:t>
+              <a:t>6/22/2016</a:t>
             </a:fld>
             <a:endParaRPr lang="en-US"/>
           </a:p>
@@ -829,7 +830,7 @@
           <a:p>
             <a:fld id="{78D91B59-3308-4288-9FFB-76344938B6F4}" type="datetimeFigureOut">
               <a:rPr lang="en-US" smtClean="0"/>
-              <a:t>11/4/2015</a:t>
+              <a:t>6/22/2016</a:t>
             </a:fld>
             <a:endParaRPr lang="en-US"/>
           </a:p>
@@ -1075,7 +1076,7 @@
           <a:p>
             <a:fld id="{78D91B59-3308-4288-9FFB-76344938B6F4}" type="datetimeFigureOut">
               <a:rPr lang="en-US" smtClean="0"/>
-              <a:t>11/4/2015</a:t>
+              <a:t>6/22/2016</a:t>
             </a:fld>
             <a:endParaRPr lang="en-US"/>
           </a:p>
@@ -1363,7 +1364,7 @@
           <a:p>
             <a:fld id="{78D91B59-3308-4288-9FFB-76344938B6F4}" type="datetimeFigureOut">
               <a:rPr lang="en-US" smtClean="0"/>
-              <a:t>11/4/2015</a:t>
+              <a:t>6/22/2016</a:t>
             </a:fld>
             <a:endParaRPr lang="en-US"/>
           </a:p>
@@ -1785,7 +1786,7 @@
           <a:p>
             <a:fld id="{78D91B59-3308-4288-9FFB-76344938B6F4}" type="datetimeFigureOut">
               <a:rPr lang="en-US" smtClean="0"/>
-              <a:t>11/4/2015</a:t>
+              <a:t>6/22/2016</a:t>
             </a:fld>
             <a:endParaRPr lang="en-US"/>
           </a:p>
@@ -1903,7 +1904,7 @@
           <a:p>
             <a:fld id="{78D91B59-3308-4288-9FFB-76344938B6F4}" type="datetimeFigureOut">
               <a:rPr lang="en-US" smtClean="0"/>
-              <a:t>11/4/2015</a:t>
+              <a:t>6/22/2016</a:t>
             </a:fld>
             <a:endParaRPr lang="en-US"/>
           </a:p>
@@ -1998,7 +1999,7 @@
           <a:p>
             <a:fld id="{78D91B59-3308-4288-9FFB-76344938B6F4}" type="datetimeFigureOut">
               <a:rPr lang="en-US" smtClean="0"/>
-              <a:t>11/4/2015</a:t>
+              <a:t>6/22/2016</a:t>
             </a:fld>
             <a:endParaRPr lang="en-US"/>
           </a:p>
@@ -2275,7 +2276,7 @@
           <a:p>
             <a:fld id="{78D91B59-3308-4288-9FFB-76344938B6F4}" type="datetimeFigureOut">
               <a:rPr lang="en-US" smtClean="0"/>
-              <a:t>11/4/2015</a:t>
+              <a:t>6/22/2016</a:t>
             </a:fld>
             <a:endParaRPr lang="en-US"/>
           </a:p>
@@ -2528,7 +2529,7 @@
           <a:p>
             <a:fld id="{78D91B59-3308-4288-9FFB-76344938B6F4}" type="datetimeFigureOut">
               <a:rPr lang="en-US" smtClean="0"/>
-              <a:t>11/4/2015</a:t>
+              <a:t>6/22/2016</a:t>
             </a:fld>
             <a:endParaRPr lang="en-US"/>
           </a:p>
@@ -2741,7 +2742,7 @@
           <a:p>
             <a:fld id="{78D91B59-3308-4288-9FFB-76344938B6F4}" type="datetimeFigureOut">
               <a:rPr lang="en-US" smtClean="0"/>
-              <a:t>11/4/2015</a:t>
+              <a:t>6/22/2016</a:t>
             </a:fld>
             <a:endParaRPr lang="en-US"/>
           </a:p>
@@ -4386,9 +4387,9 @@
         <p:grpSpPr>
           <a:xfrm>
             <a:off x="1905000" y="4267200"/>
-            <a:ext cx="4511566" cy="954107"/>
+            <a:ext cx="4708582" cy="938719"/>
             <a:chOff x="1828800" y="2859613"/>
-            <a:chExt cx="4511566" cy="954107"/>
+            <a:chExt cx="4708582" cy="938719"/>
           </a:xfrm>
         </p:grpSpPr>
         <p:sp>
@@ -4400,7 +4401,7 @@
           <p:spPr>
             <a:xfrm>
               <a:off x="1828800" y="2859613"/>
-              <a:ext cx="4187365" cy="954107"/>
+              <a:ext cx="4373313" cy="938719"/>
             </a:xfrm>
             <a:prstGeom prst="rect">
               <a:avLst/>
@@ -4420,12 +4421,12 @@
                   </a:solidFill>
                   <a:latin typeface="Serpentine-Bold" panose="02000500000000000000" pitchFamily="2" charset="0"/>
                 </a:rPr>
-                <a:t>HPX V0.9.12</a:t>
+                <a:t>HPX V0.9.99</a:t>
               </a:r>
             </a:p>
             <a:p>
               <a:r>
-                <a:rPr lang="en-US" sz="2000" i="1" dirty="0" smtClean="0">
+                <a:rPr lang="en-US" sz="2100" i="1" dirty="0" smtClean="0">
                   <a:solidFill>
                     <a:srgbClr val="243C9B"/>
                   </a:solidFill>
@@ -4433,7 +4434,7 @@
                 </a:rPr>
                 <a:t>High Performance ParalleX</a:t>
               </a:r>
-              <a:endParaRPr lang="en-US" sz="2000" i="1" dirty="0">
+              <a:endParaRPr lang="en-US" sz="2100" i="1" dirty="0">
                 <a:solidFill>
                   <a:srgbClr val="243C9B"/>
                 </a:solidFill>
@@ -4450,7 +4451,7 @@
           </p:nvSpPr>
           <p:spPr>
             <a:xfrm>
-              <a:off x="4968766" y="3068216"/>
+              <a:off x="5165782" y="3068216"/>
               <a:ext cx="1371600" cy="335757"/>
             </a:xfrm>
             <a:prstGeom prst="rect">
@@ -4542,6 +4543,109 @@
     <p:extLst>
       <p:ext uri="{BB962C8B-B14F-4D97-AF65-F5344CB8AC3E}">
         <p14:creationId xmlns:p14="http://schemas.microsoft.com/office/powerpoint/2010/main" val="1097584615"/>
+      </p:ext>
+    </p:extLst>
+  </p:cSld>
+  <p:clrMapOvr>
+    <a:masterClrMapping/>
+  </p:clrMapOvr>
+  <p:timing>
+    <p:tnLst>
+      <p:par>
+        <p:cTn id="1" dur="indefinite" restart="never" nodeType="tmRoot"/>
+      </p:par>
+    </p:tnLst>
+  </p:timing>
+</p:sld>
+</file>
+
+<file path=ppt/slides/slide7.xml><?xml version="1.0" encoding="utf-8"?>
+<p:sld xmlns:a="http://schemas.openxmlformats.org/drawingml/2006/main" xmlns:r="http://schemas.openxmlformats.org/officeDocument/2006/relationships" xmlns:p="http://schemas.openxmlformats.org/presentationml/2006/main">
+  <p:cSld>
+    <p:spTree>
+      <p:nvGrpSpPr>
+        <p:cNvPr id="1" name=""/>
+        <p:cNvGrpSpPr/>
+        <p:nvPr/>
+      </p:nvGrpSpPr>
+      <p:grpSpPr>
+        <a:xfrm>
+          <a:off x="0" y="0"/>
+          <a:ext cx="0" cy="0"/>
+          <a:chOff x="0" y="0"/>
+          <a:chExt cx="0" cy="0"/>
+        </a:xfrm>
+      </p:grpSpPr>
+      <p:sp>
+        <p:nvSpPr>
+          <p:cNvPr id="8" name="TextBox 7"/>
+          <p:cNvSpPr txBox="1"/>
+          <p:nvPr/>
+        </p:nvSpPr>
+        <p:spPr>
+          <a:xfrm>
+            <a:off x="1828800" y="2727277"/>
+            <a:ext cx="4649030" cy="1169551"/>
+          </a:xfrm>
+          <a:prstGeom prst="rect">
+            <a:avLst/>
+          </a:prstGeom>
+          <a:noFill/>
+        </p:spPr>
+        <p:txBody>
+          <a:bodyPr wrap="none" rtlCol="0">
+            <a:spAutoFit/>
+          </a:bodyPr>
+          <a:lstStyle/>
+          <a:p>
+            <a:r>
+              <a:rPr lang="en-US" sz="4800" i="1" dirty="0" smtClean="0">
+                <a:solidFill>
+                  <a:srgbClr val="243C9B"/>
+                </a:solidFill>
+                <a:latin typeface="Serpentine-Bold" panose="02000500000000000000" pitchFamily="2" charset="0"/>
+              </a:rPr>
+              <a:t>HPX </a:t>
+            </a:r>
+            <a:r>
+              <a:rPr lang="en-US" sz="4800" i="1" dirty="0" smtClean="0">
+                <a:solidFill>
+                  <a:srgbClr val="243C9B"/>
+                </a:solidFill>
+                <a:latin typeface="Serpentine-Bold" panose="02000500000000000000" pitchFamily="2" charset="0"/>
+              </a:rPr>
+              <a:t>V0.9.99</a:t>
+            </a:r>
+            <a:endParaRPr lang="en-US" sz="4800" i="1" dirty="0" smtClean="0">
+              <a:solidFill>
+                <a:srgbClr val="243C9B"/>
+              </a:solidFill>
+              <a:latin typeface="Serpentine-Bold" panose="02000500000000000000" pitchFamily="2" charset="0"/>
+            </a:endParaRPr>
+          </a:p>
+          <a:p>
+            <a:r>
+              <a:rPr lang="en-US" sz="2200" i="1" dirty="0" smtClean="0">
+                <a:solidFill>
+                  <a:srgbClr val="243C9B"/>
+                </a:solidFill>
+                <a:latin typeface="Serpentine-Bold" panose="02000500000000000000" pitchFamily="2" charset="0"/>
+              </a:rPr>
+              <a:t>High Performance ParalleX</a:t>
+            </a:r>
+            <a:endParaRPr lang="en-US" sz="2200" i="1" dirty="0">
+              <a:solidFill>
+                <a:srgbClr val="243C9B"/>
+              </a:solidFill>
+              <a:latin typeface="Serpentine-Bold" panose="02000500000000000000" pitchFamily="2" charset="0"/>
+            </a:endParaRPr>
+          </a:p>
+        </p:txBody>
+      </p:sp>
+    </p:spTree>
+    <p:extLst>
+      <p:ext uri="{BB962C8B-B14F-4D97-AF65-F5344CB8AC3E}">
+        <p14:creationId xmlns:p14="http://schemas.microsoft.com/office/powerpoint/2010/main" val="2058638840"/>
       </p:ext>
     </p:extLst>
   </p:cSld>

</xml_diff>

<commit_message>
New logos, more closed tickets added
</commit_message>
<xml_diff>
--- a/docs/version.pptx
+++ b/docs/version.pptx
@@ -310,7 +310,7 @@
           <a:p>
             <a:fld id="{78D91B59-3308-4288-9FFB-76344938B6F4}" type="datetimeFigureOut">
               <a:rPr lang="en-US" smtClean="0"/>
-              <a:t>6/22/2016</a:t>
+              <a:t>6/23/2016</a:t>
             </a:fld>
             <a:endParaRPr lang="en-US"/>
           </a:p>
@@ -480,7 +480,7 @@
           <a:p>
             <a:fld id="{78D91B59-3308-4288-9FFB-76344938B6F4}" type="datetimeFigureOut">
               <a:rPr lang="en-US" smtClean="0"/>
-              <a:t>6/22/2016</a:t>
+              <a:t>6/23/2016</a:t>
             </a:fld>
             <a:endParaRPr lang="en-US"/>
           </a:p>
@@ -660,7 +660,7 @@
           <a:p>
             <a:fld id="{78D91B59-3308-4288-9FFB-76344938B6F4}" type="datetimeFigureOut">
               <a:rPr lang="en-US" smtClean="0"/>
-              <a:t>6/22/2016</a:t>
+              <a:t>6/23/2016</a:t>
             </a:fld>
             <a:endParaRPr lang="en-US"/>
           </a:p>
@@ -830,7 +830,7 @@
           <a:p>
             <a:fld id="{78D91B59-3308-4288-9FFB-76344938B6F4}" type="datetimeFigureOut">
               <a:rPr lang="en-US" smtClean="0"/>
-              <a:t>6/22/2016</a:t>
+              <a:t>6/23/2016</a:t>
             </a:fld>
             <a:endParaRPr lang="en-US"/>
           </a:p>
@@ -1076,7 +1076,7 @@
           <a:p>
             <a:fld id="{78D91B59-3308-4288-9FFB-76344938B6F4}" type="datetimeFigureOut">
               <a:rPr lang="en-US" smtClean="0"/>
-              <a:t>6/22/2016</a:t>
+              <a:t>6/23/2016</a:t>
             </a:fld>
             <a:endParaRPr lang="en-US"/>
           </a:p>
@@ -1364,7 +1364,7 @@
           <a:p>
             <a:fld id="{78D91B59-3308-4288-9FFB-76344938B6F4}" type="datetimeFigureOut">
               <a:rPr lang="en-US" smtClean="0"/>
-              <a:t>6/22/2016</a:t>
+              <a:t>6/23/2016</a:t>
             </a:fld>
             <a:endParaRPr lang="en-US"/>
           </a:p>
@@ -1786,7 +1786,7 @@
           <a:p>
             <a:fld id="{78D91B59-3308-4288-9FFB-76344938B6F4}" type="datetimeFigureOut">
               <a:rPr lang="en-US" smtClean="0"/>
-              <a:t>6/22/2016</a:t>
+              <a:t>6/23/2016</a:t>
             </a:fld>
             <a:endParaRPr lang="en-US"/>
           </a:p>
@@ -1904,7 +1904,7 @@
           <a:p>
             <a:fld id="{78D91B59-3308-4288-9FFB-76344938B6F4}" type="datetimeFigureOut">
               <a:rPr lang="en-US" smtClean="0"/>
-              <a:t>6/22/2016</a:t>
+              <a:t>6/23/2016</a:t>
             </a:fld>
             <a:endParaRPr lang="en-US"/>
           </a:p>
@@ -1999,7 +1999,7 @@
           <a:p>
             <a:fld id="{78D91B59-3308-4288-9FFB-76344938B6F4}" type="datetimeFigureOut">
               <a:rPr lang="en-US" smtClean="0"/>
-              <a:t>6/22/2016</a:t>
+              <a:t>6/23/2016</a:t>
             </a:fld>
             <a:endParaRPr lang="en-US"/>
           </a:p>
@@ -2276,7 +2276,7 @@
           <a:p>
             <a:fld id="{78D91B59-3308-4288-9FFB-76344938B6F4}" type="datetimeFigureOut">
               <a:rPr lang="en-US" smtClean="0"/>
-              <a:t>6/22/2016</a:t>
+              <a:t>6/23/2016</a:t>
             </a:fld>
             <a:endParaRPr lang="en-US"/>
           </a:p>
@@ -2529,7 +2529,7 @@
           <a:p>
             <a:fld id="{78D91B59-3308-4288-9FFB-76344938B6F4}" type="datetimeFigureOut">
               <a:rPr lang="en-US" smtClean="0"/>
-              <a:t>6/22/2016</a:t>
+              <a:t>6/23/2016</a:t>
             </a:fld>
             <a:endParaRPr lang="en-US"/>
           </a:p>
@@ -2742,7 +2742,7 @@
           <a:p>
             <a:fld id="{78D91B59-3308-4288-9FFB-76344938B6F4}" type="datetimeFigureOut">
               <a:rPr lang="en-US" smtClean="0"/>
-              <a:t>6/22/2016</a:t>
+              <a:t>6/23/2016</a:t>
             </a:fld>
             <a:endParaRPr lang="en-US"/>
           </a:p>
@@ -4378,116 +4378,6 @@
           <a:chExt cx="0" cy="0"/>
         </a:xfrm>
       </p:grpSpPr>
-      <p:grpSp>
-        <p:nvGrpSpPr>
-          <p:cNvPr id="4" name="Group 3"/>
-          <p:cNvGrpSpPr/>
-          <p:nvPr/>
-        </p:nvGrpSpPr>
-        <p:grpSpPr>
-          <a:xfrm>
-            <a:off x="1905000" y="4267200"/>
-            <a:ext cx="4708582" cy="938719"/>
-            <a:chOff x="1828800" y="2859613"/>
-            <a:chExt cx="4708582" cy="938719"/>
-          </a:xfrm>
-        </p:grpSpPr>
-        <p:sp>
-          <p:nvSpPr>
-            <p:cNvPr id="2" name="TextBox 1"/>
-            <p:cNvSpPr txBox="1"/>
-            <p:nvPr/>
-          </p:nvSpPr>
-          <p:spPr>
-            <a:xfrm>
-              <a:off x="1828800" y="2859613"/>
-              <a:ext cx="4373313" cy="938719"/>
-            </a:xfrm>
-            <a:prstGeom prst="rect">
-              <a:avLst/>
-            </a:prstGeom>
-            <a:noFill/>
-          </p:spPr>
-          <p:txBody>
-            <a:bodyPr wrap="none" rtlCol="0">
-              <a:spAutoFit/>
-            </a:bodyPr>
-            <a:lstStyle/>
-            <a:p>
-              <a:r>
-                <a:rPr lang="en-US" sz="3400" i="1" dirty="0" smtClean="0">
-                  <a:solidFill>
-                    <a:srgbClr val="243C9B"/>
-                  </a:solidFill>
-                  <a:latin typeface="Serpentine-Bold" panose="02000500000000000000" pitchFamily="2" charset="0"/>
-                </a:rPr>
-                <a:t>HPX V0.9.99</a:t>
-              </a:r>
-            </a:p>
-            <a:p>
-              <a:r>
-                <a:rPr lang="en-US" sz="2100" i="1" dirty="0" smtClean="0">
-                  <a:solidFill>
-                    <a:srgbClr val="243C9B"/>
-                  </a:solidFill>
-                  <a:latin typeface="Serpentine-Bold" panose="02000500000000000000" pitchFamily="2" charset="0"/>
-                </a:rPr>
-                <a:t>High Performance ParalleX</a:t>
-              </a:r>
-              <a:endParaRPr lang="en-US" sz="2100" i="1" dirty="0">
-                <a:solidFill>
-                  <a:srgbClr val="243C9B"/>
-                </a:solidFill>
-                <a:latin typeface="Serpentine-Bold" panose="02000500000000000000" pitchFamily="2" charset="0"/>
-              </a:endParaRPr>
-            </a:p>
-          </p:txBody>
-        </p:sp>
-        <p:sp>
-          <p:nvSpPr>
-            <p:cNvPr id="3" name="TextBox 2"/>
-            <p:cNvSpPr txBox="1"/>
-            <p:nvPr/>
-          </p:nvSpPr>
-          <p:spPr>
-            <a:xfrm>
-              <a:off x="5165782" y="3068216"/>
-              <a:ext cx="1371600" cy="335757"/>
-            </a:xfrm>
-            <a:prstGeom prst="rect">
-              <a:avLst/>
-            </a:prstGeom>
-            <a:noFill/>
-          </p:spPr>
-          <p:txBody>
-            <a:bodyPr wrap="square" rtlCol="0">
-              <a:spAutoFit/>
-            </a:bodyPr>
-            <a:lstStyle/>
-            <a:p>
-              <a:r>
-                <a:rPr lang="en-US" dirty="0" smtClean="0">
-                  <a:solidFill>
-                    <a:srgbClr val="C00000">
-                      <a:alpha val="90000"/>
-                    </a:srgbClr>
-                  </a:solidFill>
-                  <a:latin typeface="Arial Black" panose="020B0A04020102020204" pitchFamily="34" charset="0"/>
-                </a:rPr>
-                <a:t>DRAFT</a:t>
-              </a:r>
-              <a:endParaRPr lang="en-US" dirty="0">
-                <a:solidFill>
-                  <a:srgbClr val="C00000">
-                    <a:alpha val="90000"/>
-                  </a:srgbClr>
-                </a:solidFill>
-                <a:latin typeface="Arial Black" panose="020B0A04020102020204" pitchFamily="34" charset="0"/>
-              </a:endParaRPr>
-            </a:p>
-          </p:txBody>
-        </p:sp>
-      </p:grpSp>
       <p:sp>
         <p:nvSpPr>
           <p:cNvPr id="8" name="TextBox 7"/>
@@ -4576,72 +4466,253 @@
           <a:chExt cx="0" cy="0"/>
         </a:xfrm>
       </p:grpSpPr>
-      <p:sp>
-        <p:nvSpPr>
-          <p:cNvPr id="8" name="TextBox 7"/>
-          <p:cNvSpPr txBox="1"/>
+      <p:grpSp>
+        <p:nvGrpSpPr>
+          <p:cNvPr id="15" name="Group 14"/>
+          <p:cNvGrpSpPr/>
           <p:nvPr/>
-        </p:nvSpPr>
-        <p:spPr>
+        </p:nvGrpSpPr>
+        <p:grpSpPr>
           <a:xfrm>
-            <a:off x="1828800" y="2727277"/>
-            <a:ext cx="4649030" cy="1169551"/>
+            <a:off x="1019218" y="2590800"/>
+            <a:ext cx="7154374" cy="1156850"/>
+            <a:chOff x="1019218" y="2590800"/>
+            <a:chExt cx="7154374" cy="1156850"/>
           </a:xfrm>
-          <a:prstGeom prst="rect">
-            <a:avLst/>
-          </a:prstGeom>
-          <a:noFill/>
-        </p:spPr>
-        <p:txBody>
-          <a:bodyPr wrap="none" rtlCol="0">
-            <a:spAutoFit/>
-          </a:bodyPr>
-          <a:lstStyle/>
-          <a:p>
-            <a:r>
-              <a:rPr lang="en-US" sz="4800" i="1" dirty="0" smtClean="0">
+        </p:grpSpPr>
+        <p:grpSp>
+          <p:nvGrpSpPr>
+            <p:cNvPr id="4" name="Group 3"/>
+            <p:cNvGrpSpPr/>
+            <p:nvPr/>
+          </p:nvGrpSpPr>
+          <p:grpSpPr>
+            <a:xfrm>
+              <a:off x="1019218" y="2590800"/>
+              <a:ext cx="7154374" cy="1107996"/>
+              <a:chOff x="1019218" y="2590800"/>
+              <a:chExt cx="7154374" cy="1107996"/>
+            </a:xfrm>
+          </p:grpSpPr>
+          <p:sp>
+            <p:nvSpPr>
+              <p:cNvPr id="8" name="TextBox 7"/>
+              <p:cNvSpPr txBox="1"/>
+              <p:nvPr/>
+            </p:nvSpPr>
+            <p:spPr>
+              <a:xfrm>
+                <a:off x="1844615" y="2590800"/>
+                <a:ext cx="6328977" cy="1107996"/>
+              </a:xfrm>
+              <a:prstGeom prst="rect">
+                <a:avLst/>
+              </a:prstGeom>
+              <a:noFill/>
+            </p:spPr>
+            <p:txBody>
+              <a:bodyPr wrap="none" rtlCol="0">
+                <a:spAutoFit/>
+              </a:bodyPr>
+              <a:lstStyle/>
+              <a:p>
+                <a:r>
+                  <a:rPr lang="en-US" sz="6600" i="1" dirty="0" smtClean="0">
+                    <a:solidFill>
+                      <a:srgbClr val="10155E"/>
+                    </a:solidFill>
+                    <a:latin typeface="Serpentine-Bold" panose="02000500000000000000" pitchFamily="2" charset="0"/>
+                  </a:rPr>
+                  <a:t>HPX </a:t>
+                </a:r>
+                <a:r>
+                  <a:rPr lang="en-US" sz="6600" i="1" dirty="0" smtClean="0">
+                    <a:solidFill>
+                      <a:srgbClr val="10155E"/>
+                    </a:solidFill>
+                    <a:latin typeface="Serpentine-Bold" panose="02000500000000000000" pitchFamily="2" charset="0"/>
+                  </a:rPr>
+                  <a:t>V0.9.99</a:t>
+                </a:r>
+                <a:endParaRPr lang="en-US" sz="6600" i="1" dirty="0" smtClean="0">
+                  <a:solidFill>
+                    <a:srgbClr val="10155E"/>
+                  </a:solidFill>
+                  <a:latin typeface="Serpentine-Bold" panose="02000500000000000000" pitchFamily="2" charset="0"/>
+                </a:endParaRPr>
+              </a:p>
+            </p:txBody>
+          </p:sp>
+          <p:pic>
+            <p:nvPicPr>
+              <p:cNvPr id="3" name="Picture 2"/>
+              <p:cNvPicPr>
+                <a:picLocks noChangeAspect="1"/>
+              </p:cNvPicPr>
+              <p:nvPr/>
+            </p:nvPicPr>
+            <p:blipFill>
+              <a:blip r:embed="rId2">
+                <a:extLst>
+                  <a:ext uri="{28A0092B-C50C-407E-A947-70E740481C1C}">
+                    <a14:useLocalDpi xmlns:a14="http://schemas.microsoft.com/office/drawing/2010/main" val="0"/>
+                  </a:ext>
+                </a:extLst>
+              </a:blip>
+              <a:stretch>
+                <a:fillRect/>
+              </a:stretch>
+            </p:blipFill>
+            <p:spPr>
+              <a:xfrm>
+                <a:off x="1019218" y="2865951"/>
+                <a:ext cx="825397" cy="825397"/>
+              </a:xfrm>
+              <a:prstGeom prst="rect">
+                <a:avLst/>
+              </a:prstGeom>
+            </p:spPr>
+          </p:pic>
+        </p:grpSp>
+        <p:sp>
+          <p:nvSpPr>
+            <p:cNvPr id="11" name="TextBox 10"/>
+            <p:cNvSpPr txBox="1"/>
+            <p:nvPr/>
+          </p:nvSpPr>
+          <p:spPr>
+            <a:xfrm>
+              <a:off x="1927050" y="3442951"/>
+              <a:ext cx="846476" cy="304699"/>
+            </a:xfrm>
+            <a:prstGeom prst="rect">
+              <a:avLst/>
+            </a:prstGeom>
+            <a:noFill/>
+          </p:spPr>
+          <p:txBody>
+            <a:bodyPr wrap="square" rtlCol="0">
+              <a:spAutoFit/>
+            </a:bodyPr>
+            <a:lstStyle/>
+            <a:p>
+              <a:r>
+                <a:rPr lang="en-US" sz="1200" dirty="0" smtClean="0">
+                  <a:solidFill>
+                    <a:srgbClr val="C00000">
+                      <a:alpha val="90000"/>
+                    </a:srgbClr>
+                  </a:solidFill>
+                  <a:latin typeface="Arial Black" panose="020B0A04020102020204" pitchFamily="34" charset="0"/>
+                </a:rPr>
+                <a:t>DRAFT</a:t>
+              </a:r>
+              <a:endParaRPr lang="en-US" sz="1200" dirty="0">
                 <a:solidFill>
-                  <a:srgbClr val="243C9B"/>
+                  <a:srgbClr val="C00000">
+                    <a:alpha val="90000"/>
+                  </a:srgbClr>
+                </a:solidFill>
+                <a:latin typeface="Arial Black" panose="020B0A04020102020204" pitchFamily="34" charset="0"/>
+              </a:endParaRPr>
+            </a:p>
+          </p:txBody>
+        </p:sp>
+      </p:grpSp>
+      <p:grpSp>
+        <p:nvGrpSpPr>
+          <p:cNvPr id="12" name="Group 11"/>
+          <p:cNvGrpSpPr/>
+          <p:nvPr/>
+        </p:nvGrpSpPr>
+        <p:grpSpPr>
+          <a:xfrm>
+            <a:off x="1019218" y="4035084"/>
+            <a:ext cx="7154374" cy="1107996"/>
+            <a:chOff x="1019218" y="2681109"/>
+            <a:chExt cx="7154374" cy="1107996"/>
+          </a:xfrm>
+        </p:grpSpPr>
+        <p:sp>
+          <p:nvSpPr>
+            <p:cNvPr id="13" name="TextBox 12"/>
+            <p:cNvSpPr txBox="1"/>
+            <p:nvPr/>
+          </p:nvSpPr>
+          <p:spPr>
+            <a:xfrm>
+              <a:off x="1844615" y="2681109"/>
+              <a:ext cx="6328977" cy="1107996"/>
+            </a:xfrm>
+            <a:prstGeom prst="rect">
+              <a:avLst/>
+            </a:prstGeom>
+            <a:noFill/>
+          </p:spPr>
+          <p:txBody>
+            <a:bodyPr wrap="none" rtlCol="0">
+              <a:spAutoFit/>
+            </a:bodyPr>
+            <a:lstStyle/>
+            <a:p>
+              <a:r>
+                <a:rPr lang="en-US" sz="6600" i="1" dirty="0" smtClean="0">
+                  <a:solidFill>
+                    <a:srgbClr val="10155E"/>
+                  </a:solidFill>
+                  <a:latin typeface="Serpentine-Bold" panose="02000500000000000000" pitchFamily="2" charset="0"/>
+                </a:rPr>
+                <a:t>HPX </a:t>
+              </a:r>
+              <a:r>
+                <a:rPr lang="en-US" sz="6600" i="1" dirty="0" smtClean="0">
+                  <a:solidFill>
+                    <a:srgbClr val="10155E"/>
+                  </a:solidFill>
+                  <a:latin typeface="Serpentine-Bold" panose="02000500000000000000" pitchFamily="2" charset="0"/>
+                </a:rPr>
+                <a:t>V0.9.99</a:t>
+              </a:r>
+              <a:endParaRPr lang="en-US" sz="6600" i="1" dirty="0" smtClean="0">
+                <a:solidFill>
+                  <a:srgbClr val="10155E"/>
                 </a:solidFill>
                 <a:latin typeface="Serpentine-Bold" panose="02000500000000000000" pitchFamily="2" charset="0"/>
-              </a:rPr>
-              <a:t>HPX </a:t>
-            </a:r>
-            <a:r>
-              <a:rPr lang="en-US" sz="4800" i="1" dirty="0" smtClean="0">
-                <a:solidFill>
-                  <a:srgbClr val="243C9B"/>
-                </a:solidFill>
-                <a:latin typeface="Serpentine-Bold" panose="02000500000000000000" pitchFamily="2" charset="0"/>
-              </a:rPr>
-              <a:t>V0.9.99</a:t>
-            </a:r>
-            <a:endParaRPr lang="en-US" sz="4800" i="1" dirty="0" smtClean="0">
-              <a:solidFill>
-                <a:srgbClr val="243C9B"/>
-              </a:solidFill>
-              <a:latin typeface="Serpentine-Bold" panose="02000500000000000000" pitchFamily="2" charset="0"/>
-            </a:endParaRPr>
-          </a:p>
-          <a:p>
-            <a:r>
-              <a:rPr lang="en-US" sz="2200" i="1" dirty="0" smtClean="0">
-                <a:solidFill>
-                  <a:srgbClr val="243C9B"/>
-                </a:solidFill>
-                <a:latin typeface="Serpentine-Bold" panose="02000500000000000000" pitchFamily="2" charset="0"/>
-              </a:rPr>
-              <a:t>High Performance ParalleX</a:t>
-            </a:r>
-            <a:endParaRPr lang="en-US" sz="2200" i="1" dirty="0">
-              <a:solidFill>
-                <a:srgbClr val="243C9B"/>
-              </a:solidFill>
-              <a:latin typeface="Serpentine-Bold" panose="02000500000000000000" pitchFamily="2" charset="0"/>
-            </a:endParaRPr>
-          </a:p>
-        </p:txBody>
-      </p:sp>
+              </a:endParaRPr>
+            </a:p>
+          </p:txBody>
+        </p:sp>
+        <p:pic>
+          <p:nvPicPr>
+            <p:cNvPr id="14" name="Picture 13"/>
+            <p:cNvPicPr>
+              <a:picLocks noChangeAspect="1"/>
+            </p:cNvPicPr>
+            <p:nvPr/>
+          </p:nvPicPr>
+          <p:blipFill>
+            <a:blip r:embed="rId2">
+              <a:extLst>
+                <a:ext uri="{28A0092B-C50C-407E-A947-70E740481C1C}">
+                  <a14:useLocalDpi xmlns:a14="http://schemas.microsoft.com/office/drawing/2010/main" val="0"/>
+                </a:ext>
+              </a:extLst>
+            </a:blip>
+            <a:stretch>
+              <a:fillRect/>
+            </a:stretch>
+          </p:blipFill>
+          <p:spPr>
+            <a:xfrm>
+              <a:off x="1019218" y="2865951"/>
+              <a:ext cx="825397" cy="825397"/>
+            </a:xfrm>
+            <a:prstGeom prst="rect">
+              <a:avLst/>
+            </a:prstGeom>
+          </p:spPr>
+        </p:pic>
+      </p:grpSp>
     </p:spTree>
     <p:extLst>
       <p:ext uri="{BB962C8B-B14F-4D97-AF65-F5344CB8AC3E}">

</xml_diff>

<commit_message>
Preparing docs for master (targeting V1.0)
</commit_message>
<xml_diff>
--- a/docs/version.pptx
+++ b/docs/version.pptx
@@ -12,6 +12,7 @@
     <p:sldId id="260" r:id="rId6"/>
     <p:sldId id="261" r:id="rId7"/>
     <p:sldId id="262" r:id="rId8"/>
+    <p:sldId id="263" r:id="rId9"/>
   </p:sldIdLst>
   <p:sldSz cx="9144000" cy="6858000" type="screen4x3"/>
   <p:notesSz cx="6858000" cy="9144000"/>
@@ -310,7 +311,7 @@
           <a:p>
             <a:fld id="{78D91B59-3308-4288-9FFB-76344938B6F4}" type="datetimeFigureOut">
               <a:rPr lang="en-US" smtClean="0"/>
-              <a:t>6/23/2016</a:t>
+              <a:t>7/15/2016</a:t>
             </a:fld>
             <a:endParaRPr lang="en-US"/>
           </a:p>
@@ -480,7 +481,7 @@
           <a:p>
             <a:fld id="{78D91B59-3308-4288-9FFB-76344938B6F4}" type="datetimeFigureOut">
               <a:rPr lang="en-US" smtClean="0"/>
-              <a:t>6/23/2016</a:t>
+              <a:t>7/15/2016</a:t>
             </a:fld>
             <a:endParaRPr lang="en-US"/>
           </a:p>
@@ -660,7 +661,7 @@
           <a:p>
             <a:fld id="{78D91B59-3308-4288-9FFB-76344938B6F4}" type="datetimeFigureOut">
               <a:rPr lang="en-US" smtClean="0"/>
-              <a:t>6/23/2016</a:t>
+              <a:t>7/15/2016</a:t>
             </a:fld>
             <a:endParaRPr lang="en-US"/>
           </a:p>
@@ -830,7 +831,7 @@
           <a:p>
             <a:fld id="{78D91B59-3308-4288-9FFB-76344938B6F4}" type="datetimeFigureOut">
               <a:rPr lang="en-US" smtClean="0"/>
-              <a:t>6/23/2016</a:t>
+              <a:t>7/15/2016</a:t>
             </a:fld>
             <a:endParaRPr lang="en-US"/>
           </a:p>
@@ -1076,7 +1077,7 @@
           <a:p>
             <a:fld id="{78D91B59-3308-4288-9FFB-76344938B6F4}" type="datetimeFigureOut">
               <a:rPr lang="en-US" smtClean="0"/>
-              <a:t>6/23/2016</a:t>
+              <a:t>7/15/2016</a:t>
             </a:fld>
             <a:endParaRPr lang="en-US"/>
           </a:p>
@@ -1364,7 +1365,7 @@
           <a:p>
             <a:fld id="{78D91B59-3308-4288-9FFB-76344938B6F4}" type="datetimeFigureOut">
               <a:rPr lang="en-US" smtClean="0"/>
-              <a:t>6/23/2016</a:t>
+              <a:t>7/15/2016</a:t>
             </a:fld>
             <a:endParaRPr lang="en-US"/>
           </a:p>
@@ -1786,7 +1787,7 @@
           <a:p>
             <a:fld id="{78D91B59-3308-4288-9FFB-76344938B6F4}" type="datetimeFigureOut">
               <a:rPr lang="en-US" smtClean="0"/>
-              <a:t>6/23/2016</a:t>
+              <a:t>7/15/2016</a:t>
             </a:fld>
             <a:endParaRPr lang="en-US"/>
           </a:p>
@@ -1904,7 +1905,7 @@
           <a:p>
             <a:fld id="{78D91B59-3308-4288-9FFB-76344938B6F4}" type="datetimeFigureOut">
               <a:rPr lang="en-US" smtClean="0"/>
-              <a:t>6/23/2016</a:t>
+              <a:t>7/15/2016</a:t>
             </a:fld>
             <a:endParaRPr lang="en-US"/>
           </a:p>
@@ -1999,7 +2000,7 @@
           <a:p>
             <a:fld id="{78D91B59-3308-4288-9FFB-76344938B6F4}" type="datetimeFigureOut">
               <a:rPr lang="en-US" smtClean="0"/>
-              <a:t>6/23/2016</a:t>
+              <a:t>7/15/2016</a:t>
             </a:fld>
             <a:endParaRPr lang="en-US"/>
           </a:p>
@@ -2276,7 +2277,7 @@
           <a:p>
             <a:fld id="{78D91B59-3308-4288-9FFB-76344938B6F4}" type="datetimeFigureOut">
               <a:rPr lang="en-US" smtClean="0"/>
-              <a:t>6/23/2016</a:t>
+              <a:t>7/15/2016</a:t>
             </a:fld>
             <a:endParaRPr lang="en-US"/>
           </a:p>
@@ -2529,7 +2530,7 @@
           <a:p>
             <a:fld id="{78D91B59-3308-4288-9FFB-76344938B6F4}" type="datetimeFigureOut">
               <a:rPr lang="en-US" smtClean="0"/>
-              <a:t>6/23/2016</a:t>
+              <a:t>7/15/2016</a:t>
             </a:fld>
             <a:endParaRPr lang="en-US"/>
           </a:p>
@@ -2742,7 +2743,7 @@
           <a:p>
             <a:fld id="{78D91B59-3308-4288-9FFB-76344938B6F4}" type="datetimeFigureOut">
               <a:rPr lang="en-US" smtClean="0"/>
-              <a:t>6/23/2016</a:t>
+              <a:t>7/15/2016</a:t>
             </a:fld>
             <a:endParaRPr lang="en-US"/>
           </a:p>
@@ -4523,23 +4524,8 @@
                     </a:solidFill>
                     <a:latin typeface="Serpentine-Bold" panose="02000500000000000000" pitchFamily="2" charset="0"/>
                   </a:rPr>
-                  <a:t>HPX </a:t>
+                  <a:t>HPX V0.9.99</a:t>
                 </a:r>
-                <a:r>
-                  <a:rPr lang="en-US" sz="6600" i="1" dirty="0" smtClean="0">
-                    <a:solidFill>
-                      <a:srgbClr val="10155E"/>
-                    </a:solidFill>
-                    <a:latin typeface="Serpentine-Bold" panose="02000500000000000000" pitchFamily="2" charset="0"/>
-                  </a:rPr>
-                  <a:t>V0.9.99</a:t>
-                </a:r>
-                <a:endParaRPr lang="en-US" sz="6600" i="1" dirty="0" smtClean="0">
-                  <a:solidFill>
-                    <a:srgbClr val="10155E"/>
-                  </a:solidFill>
-                  <a:latin typeface="Serpentine-Bold" panose="02000500000000000000" pitchFamily="2" charset="0"/>
-                </a:endParaRPr>
               </a:p>
             </p:txBody>
           </p:sp>
@@ -4662,6 +4648,275 @@
                   </a:solidFill>
                   <a:latin typeface="Serpentine-Bold" panose="02000500000000000000" pitchFamily="2" charset="0"/>
                 </a:rPr>
+                <a:t>HPX V0.9.99</a:t>
+              </a:r>
+            </a:p>
+          </p:txBody>
+        </p:sp>
+        <p:pic>
+          <p:nvPicPr>
+            <p:cNvPr id="14" name="Picture 13"/>
+            <p:cNvPicPr>
+              <a:picLocks noChangeAspect="1"/>
+            </p:cNvPicPr>
+            <p:nvPr/>
+          </p:nvPicPr>
+          <p:blipFill>
+            <a:blip r:embed="rId2">
+              <a:extLst>
+                <a:ext uri="{28A0092B-C50C-407E-A947-70E740481C1C}">
+                  <a14:useLocalDpi xmlns:a14="http://schemas.microsoft.com/office/drawing/2010/main" val="0"/>
+                </a:ext>
+              </a:extLst>
+            </a:blip>
+            <a:stretch>
+              <a:fillRect/>
+            </a:stretch>
+          </p:blipFill>
+          <p:spPr>
+            <a:xfrm>
+              <a:off x="1019218" y="2865951"/>
+              <a:ext cx="825397" cy="825397"/>
+            </a:xfrm>
+            <a:prstGeom prst="rect">
+              <a:avLst/>
+            </a:prstGeom>
+          </p:spPr>
+        </p:pic>
+      </p:grpSp>
+    </p:spTree>
+    <p:extLst>
+      <p:ext uri="{BB962C8B-B14F-4D97-AF65-F5344CB8AC3E}">
+        <p14:creationId xmlns:p14="http://schemas.microsoft.com/office/powerpoint/2010/main" val="2058638840"/>
+      </p:ext>
+    </p:extLst>
+  </p:cSld>
+  <p:clrMapOvr>
+    <a:masterClrMapping/>
+  </p:clrMapOvr>
+  <p:timing>
+    <p:tnLst>
+      <p:par>
+        <p:cTn id="1" dur="indefinite" restart="never" nodeType="tmRoot"/>
+      </p:par>
+    </p:tnLst>
+  </p:timing>
+</p:sld>
+</file>
+
+<file path=ppt/slides/slide8.xml><?xml version="1.0" encoding="utf-8"?>
+<p:sld xmlns:a="http://schemas.openxmlformats.org/drawingml/2006/main" xmlns:r="http://schemas.openxmlformats.org/officeDocument/2006/relationships" xmlns:p="http://schemas.openxmlformats.org/presentationml/2006/main">
+  <p:cSld>
+    <p:spTree>
+      <p:nvGrpSpPr>
+        <p:cNvPr id="1" name=""/>
+        <p:cNvGrpSpPr/>
+        <p:nvPr/>
+      </p:nvGrpSpPr>
+      <p:grpSpPr>
+        <a:xfrm>
+          <a:off x="0" y="0"/>
+          <a:ext cx="0" cy="0"/>
+          <a:chOff x="0" y="0"/>
+          <a:chExt cx="0" cy="0"/>
+        </a:xfrm>
+      </p:grpSpPr>
+      <p:grpSp>
+        <p:nvGrpSpPr>
+          <p:cNvPr id="15" name="Group 14"/>
+          <p:cNvGrpSpPr/>
+          <p:nvPr/>
+        </p:nvGrpSpPr>
+        <p:grpSpPr>
+          <a:xfrm>
+            <a:off x="1019218" y="2590800"/>
+            <a:ext cx="5304508" cy="1156850"/>
+            <a:chOff x="1019218" y="2590800"/>
+            <a:chExt cx="5304508" cy="1156850"/>
+          </a:xfrm>
+        </p:grpSpPr>
+        <p:grpSp>
+          <p:nvGrpSpPr>
+            <p:cNvPr id="4" name="Group 3"/>
+            <p:cNvGrpSpPr/>
+            <p:nvPr/>
+          </p:nvGrpSpPr>
+          <p:grpSpPr>
+            <a:xfrm>
+              <a:off x="1019218" y="2590800"/>
+              <a:ext cx="5304508" cy="1107996"/>
+              <a:chOff x="1019218" y="2590800"/>
+              <a:chExt cx="5304508" cy="1107996"/>
+            </a:xfrm>
+          </p:grpSpPr>
+          <p:sp>
+            <p:nvSpPr>
+              <p:cNvPr id="8" name="TextBox 7"/>
+              <p:cNvSpPr txBox="1"/>
+              <p:nvPr/>
+            </p:nvSpPr>
+            <p:spPr>
+              <a:xfrm>
+                <a:off x="1844615" y="2590800"/>
+                <a:ext cx="4479111" cy="1107996"/>
+              </a:xfrm>
+              <a:prstGeom prst="rect">
+                <a:avLst/>
+              </a:prstGeom>
+              <a:noFill/>
+            </p:spPr>
+            <p:txBody>
+              <a:bodyPr wrap="none" rtlCol="0">
+                <a:spAutoFit/>
+              </a:bodyPr>
+              <a:lstStyle/>
+              <a:p>
+                <a:r>
+                  <a:rPr lang="en-US" sz="6600" i="1" dirty="0" smtClean="0">
+                    <a:solidFill>
+                      <a:srgbClr val="10155E"/>
+                    </a:solidFill>
+                    <a:latin typeface="Serpentine-Bold" panose="02000500000000000000" pitchFamily="2" charset="0"/>
+                  </a:rPr>
+                  <a:t>HPX </a:t>
+                </a:r>
+                <a:r>
+                  <a:rPr lang="en-US" sz="6600" i="1" dirty="0" smtClean="0">
+                    <a:solidFill>
+                      <a:srgbClr val="10155E"/>
+                    </a:solidFill>
+                    <a:latin typeface="Serpentine-Bold" panose="02000500000000000000" pitchFamily="2" charset="0"/>
+                  </a:rPr>
+                  <a:t>V1.0</a:t>
+                </a:r>
+                <a:endParaRPr lang="en-US" sz="6600" i="1" dirty="0" smtClean="0">
+                  <a:solidFill>
+                    <a:srgbClr val="10155E"/>
+                  </a:solidFill>
+                  <a:latin typeface="Serpentine-Bold" panose="02000500000000000000" pitchFamily="2" charset="0"/>
+                </a:endParaRPr>
+              </a:p>
+            </p:txBody>
+          </p:sp>
+          <p:pic>
+            <p:nvPicPr>
+              <p:cNvPr id="3" name="Picture 2"/>
+              <p:cNvPicPr>
+                <a:picLocks noChangeAspect="1"/>
+              </p:cNvPicPr>
+              <p:nvPr/>
+            </p:nvPicPr>
+            <p:blipFill>
+              <a:blip r:embed="rId2">
+                <a:extLst>
+                  <a:ext uri="{28A0092B-C50C-407E-A947-70E740481C1C}">
+                    <a14:useLocalDpi xmlns:a14="http://schemas.microsoft.com/office/drawing/2010/main" val="0"/>
+                  </a:ext>
+                </a:extLst>
+              </a:blip>
+              <a:stretch>
+                <a:fillRect/>
+              </a:stretch>
+            </p:blipFill>
+            <p:spPr>
+              <a:xfrm>
+                <a:off x="1019218" y="2865951"/>
+                <a:ext cx="825397" cy="825397"/>
+              </a:xfrm>
+              <a:prstGeom prst="rect">
+                <a:avLst/>
+              </a:prstGeom>
+            </p:spPr>
+          </p:pic>
+        </p:grpSp>
+        <p:sp>
+          <p:nvSpPr>
+            <p:cNvPr id="11" name="TextBox 10"/>
+            <p:cNvSpPr txBox="1"/>
+            <p:nvPr/>
+          </p:nvSpPr>
+          <p:spPr>
+            <a:xfrm>
+              <a:off x="1927050" y="3442951"/>
+              <a:ext cx="846476" cy="304699"/>
+            </a:xfrm>
+            <a:prstGeom prst="rect">
+              <a:avLst/>
+            </a:prstGeom>
+            <a:noFill/>
+          </p:spPr>
+          <p:txBody>
+            <a:bodyPr wrap="square" rtlCol="0">
+              <a:spAutoFit/>
+            </a:bodyPr>
+            <a:lstStyle/>
+            <a:p>
+              <a:r>
+                <a:rPr lang="en-US" sz="1200" dirty="0" smtClean="0">
+                  <a:solidFill>
+                    <a:srgbClr val="C00000">
+                      <a:alpha val="90000"/>
+                    </a:srgbClr>
+                  </a:solidFill>
+                  <a:latin typeface="Arial Black" panose="020B0A04020102020204" pitchFamily="34" charset="0"/>
+                </a:rPr>
+                <a:t>DRAFT</a:t>
+              </a:r>
+              <a:endParaRPr lang="en-US" sz="1200" dirty="0">
+                <a:solidFill>
+                  <a:srgbClr val="C00000">
+                    <a:alpha val="90000"/>
+                  </a:srgbClr>
+                </a:solidFill>
+                <a:latin typeface="Arial Black" panose="020B0A04020102020204" pitchFamily="34" charset="0"/>
+              </a:endParaRPr>
+            </a:p>
+          </p:txBody>
+        </p:sp>
+      </p:grpSp>
+      <p:grpSp>
+        <p:nvGrpSpPr>
+          <p:cNvPr id="12" name="Group 11"/>
+          <p:cNvGrpSpPr/>
+          <p:nvPr/>
+        </p:nvGrpSpPr>
+        <p:grpSpPr>
+          <a:xfrm>
+            <a:off x="1019218" y="4035084"/>
+            <a:ext cx="5304508" cy="1107996"/>
+            <a:chOff x="1019218" y="2681109"/>
+            <a:chExt cx="5304508" cy="1107996"/>
+          </a:xfrm>
+        </p:grpSpPr>
+        <p:sp>
+          <p:nvSpPr>
+            <p:cNvPr id="13" name="TextBox 12"/>
+            <p:cNvSpPr txBox="1"/>
+            <p:nvPr/>
+          </p:nvSpPr>
+          <p:spPr>
+            <a:xfrm>
+              <a:off x="1844615" y="2681109"/>
+              <a:ext cx="4479111" cy="1107996"/>
+            </a:xfrm>
+            <a:prstGeom prst="rect">
+              <a:avLst/>
+            </a:prstGeom>
+            <a:noFill/>
+          </p:spPr>
+          <p:txBody>
+            <a:bodyPr wrap="none" rtlCol="0">
+              <a:spAutoFit/>
+            </a:bodyPr>
+            <a:lstStyle/>
+            <a:p>
+              <a:r>
+                <a:rPr lang="en-US" sz="6600" i="1" dirty="0" smtClean="0">
+                  <a:solidFill>
+                    <a:srgbClr val="10155E"/>
+                  </a:solidFill>
+                  <a:latin typeface="Serpentine-Bold" panose="02000500000000000000" pitchFamily="2" charset="0"/>
+                </a:rPr>
                 <a:t>HPX </a:t>
               </a:r>
               <a:r>
@@ -4671,7 +4926,7 @@
                   </a:solidFill>
                   <a:latin typeface="Serpentine-Bold" panose="02000500000000000000" pitchFamily="2" charset="0"/>
                 </a:rPr>
-                <a:t>V0.9.99</a:t>
+                <a:t>V1.0</a:t>
               </a:r>
               <a:endParaRPr lang="en-US" sz="6600" i="1" dirty="0" smtClean="0">
                 <a:solidFill>
@@ -4716,7 +4971,7 @@
     </p:spTree>
     <p:extLst>
       <p:ext uri="{BB962C8B-B14F-4D97-AF65-F5344CB8AC3E}">
-        <p14:creationId xmlns:p14="http://schemas.microsoft.com/office/powerpoint/2010/main" val="2058638840"/>
+        <p14:creationId xmlns:p14="http://schemas.microsoft.com/office/powerpoint/2010/main" val="3453453068"/>
       </p:ext>
     </p:extLst>
   </p:cSld>

</xml_diff>

<commit_message>
Adding images for V1.2
</commit_message>
<xml_diff>
--- a/docs/version.pptx
+++ b/docs/version.pptx
@@ -14,6 +14,7 @@
     <p:sldId id="262" r:id="rId8"/>
     <p:sldId id="263" r:id="rId9"/>
     <p:sldId id="264" r:id="rId10"/>
+    <p:sldId id="265" r:id="rId11"/>
   </p:sldIdLst>
   <p:sldSz cx="9144000" cy="6858000" type="screen4x3"/>
   <p:notesSz cx="6858000" cy="9144000"/>
@@ -312,7 +313,7 @@
           <a:p>
             <a:fld id="{78D91B59-3308-4288-9FFB-76344938B6F4}" type="datetimeFigureOut">
               <a:rPr lang="en-US" smtClean="0"/>
-              <a:t>4/21/2017</a:t>
+              <a:t>3/24/2018</a:t>
             </a:fld>
             <a:endParaRPr lang="en-US"/>
           </a:p>
@@ -482,7 +483,7 @@
           <a:p>
             <a:fld id="{78D91B59-3308-4288-9FFB-76344938B6F4}" type="datetimeFigureOut">
               <a:rPr lang="en-US" smtClean="0"/>
-              <a:t>4/21/2017</a:t>
+              <a:t>3/24/2018</a:t>
             </a:fld>
             <a:endParaRPr lang="en-US"/>
           </a:p>
@@ -662,7 +663,7 @@
           <a:p>
             <a:fld id="{78D91B59-3308-4288-9FFB-76344938B6F4}" type="datetimeFigureOut">
               <a:rPr lang="en-US" smtClean="0"/>
-              <a:t>4/21/2017</a:t>
+              <a:t>3/24/2018</a:t>
             </a:fld>
             <a:endParaRPr lang="en-US"/>
           </a:p>
@@ -832,7 +833,7 @@
           <a:p>
             <a:fld id="{78D91B59-3308-4288-9FFB-76344938B6F4}" type="datetimeFigureOut">
               <a:rPr lang="en-US" smtClean="0"/>
-              <a:t>4/21/2017</a:t>
+              <a:t>3/24/2018</a:t>
             </a:fld>
             <a:endParaRPr lang="en-US"/>
           </a:p>
@@ -1078,7 +1079,7 @@
           <a:p>
             <a:fld id="{78D91B59-3308-4288-9FFB-76344938B6F4}" type="datetimeFigureOut">
               <a:rPr lang="en-US" smtClean="0"/>
-              <a:t>4/21/2017</a:t>
+              <a:t>3/24/2018</a:t>
             </a:fld>
             <a:endParaRPr lang="en-US"/>
           </a:p>
@@ -1366,7 +1367,7 @@
           <a:p>
             <a:fld id="{78D91B59-3308-4288-9FFB-76344938B6F4}" type="datetimeFigureOut">
               <a:rPr lang="en-US" smtClean="0"/>
-              <a:t>4/21/2017</a:t>
+              <a:t>3/24/2018</a:t>
             </a:fld>
             <a:endParaRPr lang="en-US"/>
           </a:p>
@@ -1788,7 +1789,7 @@
           <a:p>
             <a:fld id="{78D91B59-3308-4288-9FFB-76344938B6F4}" type="datetimeFigureOut">
               <a:rPr lang="en-US" smtClean="0"/>
-              <a:t>4/21/2017</a:t>
+              <a:t>3/24/2018</a:t>
             </a:fld>
             <a:endParaRPr lang="en-US"/>
           </a:p>
@@ -1906,7 +1907,7 @@
           <a:p>
             <a:fld id="{78D91B59-3308-4288-9FFB-76344938B6F4}" type="datetimeFigureOut">
               <a:rPr lang="en-US" smtClean="0"/>
-              <a:t>4/21/2017</a:t>
+              <a:t>3/24/2018</a:t>
             </a:fld>
             <a:endParaRPr lang="en-US"/>
           </a:p>
@@ -2001,7 +2002,7 @@
           <a:p>
             <a:fld id="{78D91B59-3308-4288-9FFB-76344938B6F4}" type="datetimeFigureOut">
               <a:rPr lang="en-US" smtClean="0"/>
-              <a:t>4/21/2017</a:t>
+              <a:t>3/24/2018</a:t>
             </a:fld>
             <a:endParaRPr lang="en-US"/>
           </a:p>
@@ -2278,7 +2279,7 @@
           <a:p>
             <a:fld id="{78D91B59-3308-4288-9FFB-76344938B6F4}" type="datetimeFigureOut">
               <a:rPr lang="en-US" smtClean="0"/>
-              <a:t>4/21/2017</a:t>
+              <a:t>3/24/2018</a:t>
             </a:fld>
             <a:endParaRPr lang="en-US"/>
           </a:p>
@@ -2531,7 +2532,7 @@
           <a:p>
             <a:fld id="{78D91B59-3308-4288-9FFB-76344938B6F4}" type="datetimeFigureOut">
               <a:rPr lang="en-US" smtClean="0"/>
-              <a:t>4/21/2017</a:t>
+              <a:t>3/24/2018</a:t>
             </a:fld>
             <a:endParaRPr lang="en-US"/>
           </a:p>
@@ -2744,7 +2745,7 @@
           <a:p>
             <a:fld id="{78D91B59-3308-4288-9FFB-76344938B6F4}" type="datetimeFigureOut">
               <a:rPr lang="en-US" smtClean="0"/>
-              <a:t>4/21/2017</a:t>
+              <a:t>3/24/2018</a:t>
             </a:fld>
             <a:endParaRPr lang="en-US"/>
           </a:p>
@@ -3335,6 +3336,290 @@
     <p:extLst>
       <p:ext uri="{BB962C8B-B14F-4D97-AF65-F5344CB8AC3E}">
         <p14:creationId xmlns:p14="http://schemas.microsoft.com/office/powerpoint/2010/main" val="2833828608"/>
+      </p:ext>
+    </p:extLst>
+  </p:cSld>
+  <p:clrMapOvr>
+    <a:masterClrMapping/>
+  </p:clrMapOvr>
+  <p:timing>
+    <p:tnLst>
+      <p:par>
+        <p:cTn id="1" dur="indefinite" restart="never" nodeType="tmRoot"/>
+      </p:par>
+    </p:tnLst>
+  </p:timing>
+</p:sld>
+</file>
+
+<file path=ppt/slides/slide10.xml><?xml version="1.0" encoding="utf-8"?>
+<p:sld xmlns:a="http://schemas.openxmlformats.org/drawingml/2006/main" xmlns:r="http://schemas.openxmlformats.org/officeDocument/2006/relationships" xmlns:p="http://schemas.openxmlformats.org/presentationml/2006/main">
+  <p:cSld>
+    <p:spTree>
+      <p:nvGrpSpPr>
+        <p:cNvPr id="1" name=""/>
+        <p:cNvGrpSpPr/>
+        <p:nvPr/>
+      </p:nvGrpSpPr>
+      <p:grpSpPr>
+        <a:xfrm>
+          <a:off x="0" y="0"/>
+          <a:ext cx="0" cy="0"/>
+          <a:chOff x="0" y="0"/>
+          <a:chExt cx="0" cy="0"/>
+        </a:xfrm>
+      </p:grpSpPr>
+      <p:grpSp>
+        <p:nvGrpSpPr>
+          <p:cNvPr id="15" name="Group 14"/>
+          <p:cNvGrpSpPr/>
+          <p:nvPr/>
+        </p:nvGrpSpPr>
+        <p:grpSpPr>
+          <a:xfrm>
+            <a:off x="1019218" y="2590800"/>
+            <a:ext cx="5272448" cy="1156850"/>
+            <a:chOff x="1019218" y="2590800"/>
+            <a:chExt cx="5272448" cy="1156850"/>
+          </a:xfrm>
+        </p:grpSpPr>
+        <p:grpSp>
+          <p:nvGrpSpPr>
+            <p:cNvPr id="4" name="Group 3"/>
+            <p:cNvGrpSpPr/>
+            <p:nvPr/>
+          </p:nvGrpSpPr>
+          <p:grpSpPr>
+            <a:xfrm>
+              <a:off x="1019218" y="2590800"/>
+              <a:ext cx="5272448" cy="1107996"/>
+              <a:chOff x="1019218" y="2590800"/>
+              <a:chExt cx="5272448" cy="1107996"/>
+            </a:xfrm>
+          </p:grpSpPr>
+          <p:sp>
+            <p:nvSpPr>
+              <p:cNvPr id="8" name="TextBox 7"/>
+              <p:cNvSpPr txBox="1"/>
+              <p:nvPr/>
+            </p:nvSpPr>
+            <p:spPr>
+              <a:xfrm>
+                <a:off x="1844615" y="2590800"/>
+                <a:ext cx="4447051" cy="1107996"/>
+              </a:xfrm>
+              <a:prstGeom prst="rect">
+                <a:avLst/>
+              </a:prstGeom>
+              <a:noFill/>
+            </p:spPr>
+            <p:txBody>
+              <a:bodyPr wrap="none" rtlCol="0">
+                <a:spAutoFit/>
+              </a:bodyPr>
+              <a:lstStyle/>
+              <a:p>
+                <a:r>
+                  <a:rPr lang="en-US" sz="6600" i="1" dirty="0" smtClean="0">
+                    <a:solidFill>
+                      <a:srgbClr val="10155E"/>
+                    </a:solidFill>
+                    <a:latin typeface="Serpentine-Bold" panose="02000500000000000000" pitchFamily="2" charset="0"/>
+                  </a:rPr>
+                  <a:t>HPX </a:t>
+                </a:r>
+                <a:r>
+                  <a:rPr lang="en-US" sz="6600" i="1" dirty="0" smtClean="0">
+                    <a:solidFill>
+                      <a:srgbClr val="10155E"/>
+                    </a:solidFill>
+                    <a:latin typeface="Serpentine-Bold" panose="02000500000000000000" pitchFamily="2" charset="0"/>
+                  </a:rPr>
+                  <a:t>V1.2</a:t>
+                </a:r>
+                <a:endParaRPr lang="en-US" sz="6600" i="1" dirty="0" smtClean="0">
+                  <a:solidFill>
+                    <a:srgbClr val="10155E"/>
+                  </a:solidFill>
+                  <a:latin typeface="Serpentine-Bold" panose="02000500000000000000" pitchFamily="2" charset="0"/>
+                </a:endParaRPr>
+              </a:p>
+            </p:txBody>
+          </p:sp>
+          <p:pic>
+            <p:nvPicPr>
+              <p:cNvPr id="3" name="Picture 2"/>
+              <p:cNvPicPr>
+                <a:picLocks noChangeAspect="1"/>
+              </p:cNvPicPr>
+              <p:nvPr/>
+            </p:nvPicPr>
+            <p:blipFill>
+              <a:blip r:embed="rId2">
+                <a:extLst>
+                  <a:ext uri="{28A0092B-C50C-407E-A947-70E740481C1C}">
+                    <a14:useLocalDpi xmlns:a14="http://schemas.microsoft.com/office/drawing/2010/main" val="0"/>
+                  </a:ext>
+                </a:extLst>
+              </a:blip>
+              <a:stretch>
+                <a:fillRect/>
+              </a:stretch>
+            </p:blipFill>
+            <p:spPr>
+              <a:xfrm>
+                <a:off x="1019218" y="2865951"/>
+                <a:ext cx="825397" cy="825397"/>
+              </a:xfrm>
+              <a:prstGeom prst="rect">
+                <a:avLst/>
+              </a:prstGeom>
+            </p:spPr>
+          </p:pic>
+        </p:grpSp>
+        <p:sp>
+          <p:nvSpPr>
+            <p:cNvPr id="11" name="TextBox 10"/>
+            <p:cNvSpPr txBox="1"/>
+            <p:nvPr/>
+          </p:nvSpPr>
+          <p:spPr>
+            <a:xfrm>
+              <a:off x="1927050" y="3442951"/>
+              <a:ext cx="846476" cy="304699"/>
+            </a:xfrm>
+            <a:prstGeom prst="rect">
+              <a:avLst/>
+            </a:prstGeom>
+            <a:noFill/>
+          </p:spPr>
+          <p:txBody>
+            <a:bodyPr wrap="square" rtlCol="0">
+              <a:spAutoFit/>
+            </a:bodyPr>
+            <a:lstStyle/>
+            <a:p>
+              <a:r>
+                <a:rPr lang="en-US" sz="1200" dirty="0" smtClean="0">
+                  <a:solidFill>
+                    <a:srgbClr val="C00000">
+                      <a:alpha val="90000"/>
+                    </a:srgbClr>
+                  </a:solidFill>
+                  <a:latin typeface="Arial Black" panose="020B0A04020102020204" pitchFamily="34" charset="0"/>
+                </a:rPr>
+                <a:t>DRAFT</a:t>
+              </a:r>
+              <a:endParaRPr lang="en-US" sz="1200" dirty="0">
+                <a:solidFill>
+                  <a:srgbClr val="C00000">
+                    <a:alpha val="90000"/>
+                  </a:srgbClr>
+                </a:solidFill>
+                <a:latin typeface="Arial Black" panose="020B0A04020102020204" pitchFamily="34" charset="0"/>
+              </a:endParaRPr>
+            </a:p>
+          </p:txBody>
+        </p:sp>
+      </p:grpSp>
+      <p:grpSp>
+        <p:nvGrpSpPr>
+          <p:cNvPr id="12" name="Group 11"/>
+          <p:cNvGrpSpPr/>
+          <p:nvPr/>
+        </p:nvGrpSpPr>
+        <p:grpSpPr>
+          <a:xfrm>
+            <a:off x="1019218" y="4035084"/>
+            <a:ext cx="5272448" cy="1107996"/>
+            <a:chOff x="1019218" y="2681109"/>
+            <a:chExt cx="5272448" cy="1107996"/>
+          </a:xfrm>
+        </p:grpSpPr>
+        <p:sp>
+          <p:nvSpPr>
+            <p:cNvPr id="13" name="TextBox 12"/>
+            <p:cNvSpPr txBox="1"/>
+            <p:nvPr/>
+          </p:nvSpPr>
+          <p:spPr>
+            <a:xfrm>
+              <a:off x="1844615" y="2681109"/>
+              <a:ext cx="4447051" cy="1107996"/>
+            </a:xfrm>
+            <a:prstGeom prst="rect">
+              <a:avLst/>
+            </a:prstGeom>
+            <a:noFill/>
+          </p:spPr>
+          <p:txBody>
+            <a:bodyPr wrap="none" rtlCol="0">
+              <a:spAutoFit/>
+            </a:bodyPr>
+            <a:lstStyle/>
+            <a:p>
+              <a:r>
+                <a:rPr lang="en-US" sz="6600" i="1" dirty="0" smtClean="0">
+                  <a:solidFill>
+                    <a:srgbClr val="10155E"/>
+                  </a:solidFill>
+                  <a:latin typeface="Serpentine-Bold" panose="02000500000000000000" pitchFamily="2" charset="0"/>
+                </a:rPr>
+                <a:t>HPX </a:t>
+              </a:r>
+              <a:r>
+                <a:rPr lang="en-US" sz="6600" i="1" dirty="0" smtClean="0">
+                  <a:solidFill>
+                    <a:srgbClr val="10155E"/>
+                  </a:solidFill>
+                  <a:latin typeface="Serpentine-Bold" panose="02000500000000000000" pitchFamily="2" charset="0"/>
+                </a:rPr>
+                <a:t>V1.2</a:t>
+              </a:r>
+              <a:endParaRPr lang="en-US" sz="6600" i="1" dirty="0" smtClean="0">
+                <a:solidFill>
+                  <a:srgbClr val="10155E"/>
+                </a:solidFill>
+                <a:latin typeface="Serpentine-Bold" panose="02000500000000000000" pitchFamily="2" charset="0"/>
+              </a:endParaRPr>
+            </a:p>
+          </p:txBody>
+        </p:sp>
+        <p:pic>
+          <p:nvPicPr>
+            <p:cNvPr id="14" name="Picture 13"/>
+            <p:cNvPicPr>
+              <a:picLocks noChangeAspect="1"/>
+            </p:cNvPicPr>
+            <p:nvPr/>
+          </p:nvPicPr>
+          <p:blipFill>
+            <a:blip r:embed="rId2">
+              <a:extLst>
+                <a:ext uri="{28A0092B-C50C-407E-A947-70E740481C1C}">
+                  <a14:useLocalDpi xmlns:a14="http://schemas.microsoft.com/office/drawing/2010/main" val="0"/>
+                </a:ext>
+              </a:extLst>
+            </a:blip>
+            <a:stretch>
+              <a:fillRect/>
+            </a:stretch>
+          </p:blipFill>
+          <p:spPr>
+            <a:xfrm>
+              <a:off x="1019218" y="2865951"/>
+              <a:ext cx="825397" cy="825397"/>
+            </a:xfrm>
+            <a:prstGeom prst="rect">
+              <a:avLst/>
+            </a:prstGeom>
+          </p:spPr>
+        </p:pic>
+      </p:grpSp>
+    </p:spTree>
+    <p:extLst>
+      <p:ext uri="{BB962C8B-B14F-4D97-AF65-F5344CB8AC3E}">
+        <p14:creationId xmlns:p14="http://schemas.microsoft.com/office/powerpoint/2010/main" val="1453238808"/>
       </p:ext>
     </p:extLst>
   </p:cSld>
@@ -5033,23 +5318,8 @@
                     </a:solidFill>
                     <a:latin typeface="Serpentine-Bold" panose="02000500000000000000" pitchFamily="2" charset="0"/>
                   </a:rPr>
-                  <a:t>HPX </a:t>
+                  <a:t>HPX V1.1</a:t>
                 </a:r>
-                <a:r>
-                  <a:rPr lang="en-US" sz="6600" i="1" dirty="0" smtClean="0">
-                    <a:solidFill>
-                      <a:srgbClr val="10155E"/>
-                    </a:solidFill>
-                    <a:latin typeface="Serpentine-Bold" panose="02000500000000000000" pitchFamily="2" charset="0"/>
-                  </a:rPr>
-                  <a:t>V1.1</a:t>
-                </a:r>
-                <a:endParaRPr lang="en-US" sz="6600" i="1" dirty="0" smtClean="0">
-                  <a:solidFill>
-                    <a:srgbClr val="10155E"/>
-                  </a:solidFill>
-                  <a:latin typeface="Serpentine-Bold" panose="02000500000000000000" pitchFamily="2" charset="0"/>
-                </a:endParaRPr>
               </a:p>
             </p:txBody>
           </p:sp>
@@ -5172,16 +5442,7 @@
                   </a:solidFill>
                   <a:latin typeface="Serpentine-Bold" panose="02000500000000000000" pitchFamily="2" charset="0"/>
                 </a:rPr>
-                <a:t>HPX </a:t>
-              </a:r>
-              <a:r>
-                <a:rPr lang="en-US" sz="6600" i="1" smtClean="0">
-                  <a:solidFill>
-                    <a:srgbClr val="10155E"/>
-                  </a:solidFill>
-                  <a:latin typeface="Serpentine-Bold" panose="02000500000000000000" pitchFamily="2" charset="0"/>
-                </a:rPr>
-                <a:t>V1.1</a:t>
+                <a:t>HPX V1.1</a:t>
               </a:r>
               <a:endParaRPr lang="en-US" sz="6600" i="1" dirty="0" smtClean="0">
                 <a:solidFill>

</xml_diff>